<commit_message>
Finished preliminary graph of pages per VMA.
</commit_message>
<xml_diff>
--- a/CF_Poster.pptx
+++ b/CF_Poster.pptx
@@ -202,7 +202,7 @@
           <a:bodyPr lIns="0" rIns="0" tIns="0" bIns="0" anchor="b"/>
           <a:p>
             <a:pPr algn="r"/>
-            <a:fld id="{7ACDAFBB-3AD2-4FF9-9ECA-0A29DDE58DB5}" type="slidenum">
+            <a:fld id="{D137C7B9-9C0A-4671-9D9B-BB28C38DFCFE}" type="slidenum">
               <a:rPr lang="en-US" sz="1400">
                 <a:latin typeface="Times New Roman"/>
               </a:rPr>
@@ -237,14 +237,14 @@
       </p:grpSpPr>
       <p:sp>
         <p:nvSpPr>
-          <p:cNvPr id="451" name="CustomShape 1"/>
+          <p:cNvPr id="452" name="CustomShape 1"/>
           <p:cNvSpPr/>
           <p:nvPr/>
         </p:nvSpPr>
         <p:spPr>
           <a:xfrm>
             <a:off x="4143600" y="9119520"/>
-            <a:ext cx="3168000" cy="478080"/>
+            <a:ext cx="3167640" cy="477720"/>
           </a:xfrm>
           <a:prstGeom prst="rect">
             <a:avLst/>
@@ -262,7 +262,7 @@
                 <a:spcPct val="100000"/>
               </a:lnSpc>
             </a:pPr>
-            <a:fld id="{210A6A3F-9A05-4916-969B-56AAAC533D87}" type="slidenum">
+            <a:fld id="{5F9CA4CC-7D2D-4986-A62B-BC1943F8AE5F}" type="slidenum">
               <a:rPr lang="en-US" sz="1200">
                 <a:solidFill>
                   <a:srgbClr val="000000"/>
@@ -278,7 +278,7 @@
       </p:sp>
       <p:sp>
         <p:nvSpPr>
-          <p:cNvPr id="452" name="PlaceHolder 2"/>
+          <p:cNvPr id="453" name="PlaceHolder 2"/>
           <p:cNvSpPr>
             <a:spLocks noGrp="1"/>
           </p:cNvSpPr>
@@ -289,7 +289,7 @@
         <p:spPr>
           <a:xfrm>
             <a:off x="731520" y="4561560"/>
-            <a:ext cx="5850360" cy="4318560"/>
+            <a:ext cx="5850000" cy="4318200"/>
           </a:xfrm>
           <a:prstGeom prst="rect">
             <a:avLst/>
@@ -12124,7 +12124,7 @@
         <p:spPr>
           <a:xfrm>
             <a:off x="9980640" y="7702560"/>
-            <a:ext cx="23927400" cy="19090800"/>
+            <a:ext cx="23927040" cy="19090440"/>
           </a:xfrm>
           <a:prstGeom prst="rect">
             <a:avLst/>
@@ -12149,7 +12149,7 @@
         <p:spPr>
           <a:xfrm>
             <a:off x="9980640" y="7702560"/>
-            <a:ext cx="23927400" cy="19090800"/>
+            <a:ext cx="23927040" cy="19090440"/>
           </a:xfrm>
           <a:prstGeom prst="rect">
             <a:avLst/>
@@ -12174,7 +12174,7 @@
         <p:spPr>
           <a:xfrm>
             <a:off x="9980640" y="7702560"/>
-            <a:ext cx="23928120" cy="19091520"/>
+            <a:ext cx="23927760" cy="19091160"/>
           </a:xfrm>
           <a:prstGeom prst="rect">
             <a:avLst/>
@@ -12199,7 +12199,7 @@
         <p:spPr>
           <a:xfrm>
             <a:off x="9980640" y="7702560"/>
-            <a:ext cx="23928120" cy="19091520"/>
+            <a:ext cx="23927760" cy="19091160"/>
           </a:xfrm>
           <a:prstGeom prst="rect">
             <a:avLst/>
@@ -13014,7 +13014,7 @@
         <p:spPr>
           <a:xfrm>
             <a:off x="2194560" y="1313280"/>
-            <a:ext cx="39501000" cy="5496840"/>
+            <a:ext cx="39501360" cy="5496840"/>
           </a:xfrm>
           <a:prstGeom prst="rect">
             <a:avLst/>
@@ -13046,7 +13046,7 @@
         <p:spPr>
           <a:xfrm>
             <a:off x="2194560" y="7702560"/>
-            <a:ext cx="19276200" cy="9106200"/>
+            <a:ext cx="19276200" cy="9106560"/>
           </a:xfrm>
           <a:prstGeom prst="rect">
             <a:avLst/>
@@ -13167,7 +13167,7 @@
         <p:spPr>
           <a:xfrm>
             <a:off x="22435200" y="7702560"/>
-            <a:ext cx="19276200" cy="9106200"/>
+            <a:ext cx="19276200" cy="9106560"/>
           </a:xfrm>
           <a:prstGeom prst="rect">
             <a:avLst/>
@@ -13287,8 +13287,8 @@
         </p:nvSpPr>
         <p:spPr>
           <a:xfrm>
-            <a:off x="2194560" y="17674560"/>
-            <a:ext cx="39501000" cy="9106200"/>
+            <a:off x="2194560" y="17674920"/>
+            <a:ext cx="39501360" cy="9106560"/>
           </a:xfrm>
           <a:prstGeom prst="rect">
             <a:avLst/>
@@ -13453,7 +13453,7 @@
         <p:spPr>
           <a:xfrm>
             <a:off x="2194560" y="1313280"/>
-            <a:ext cx="39501000" cy="5496840"/>
+            <a:ext cx="39501360" cy="5496840"/>
           </a:xfrm>
           <a:prstGeom prst="rect">
             <a:avLst/>
@@ -13485,7 +13485,7 @@
         <p:spPr>
           <a:xfrm>
             <a:off x="2194560" y="7702560"/>
-            <a:ext cx="39501000" cy="9106200"/>
+            <a:ext cx="39501360" cy="9106560"/>
           </a:xfrm>
           <a:prstGeom prst="rect">
             <a:avLst/>
@@ -13605,8 +13605,8 @@
         </p:nvSpPr>
         <p:spPr>
           <a:xfrm>
-            <a:off x="2194560" y="17674560"/>
-            <a:ext cx="39501000" cy="9106200"/>
+            <a:off x="2194560" y="17674920"/>
+            <a:ext cx="39501360" cy="9106560"/>
           </a:xfrm>
           <a:prstGeom prst="rect">
             <a:avLst/>
@@ -13771,7 +13771,7 @@
         <p:spPr>
           <a:xfrm>
             <a:off x="2194560" y="1313280"/>
-            <a:ext cx="39501000" cy="5496840"/>
+            <a:ext cx="39501360" cy="5496840"/>
           </a:xfrm>
           <a:prstGeom prst="rect">
             <a:avLst/>
@@ -13803,7 +13803,7 @@
         <p:spPr>
           <a:xfrm>
             <a:off x="2194560" y="7702560"/>
-            <a:ext cx="19276200" cy="9106200"/>
+            <a:ext cx="19276200" cy="9106560"/>
           </a:xfrm>
           <a:prstGeom prst="rect">
             <a:avLst/>
@@ -13924,7 +13924,7 @@
         <p:spPr>
           <a:xfrm>
             <a:off x="22435200" y="7702560"/>
-            <a:ext cx="19276200" cy="9106200"/>
+            <a:ext cx="19276200" cy="9106560"/>
           </a:xfrm>
           <a:prstGeom prst="rect">
             <a:avLst/>
@@ -14044,8 +14044,8 @@
         </p:nvSpPr>
         <p:spPr>
           <a:xfrm>
-            <a:off x="22435200" y="17674560"/>
-            <a:ext cx="19276200" cy="9106200"/>
+            <a:off x="22435200" y="17674920"/>
+            <a:ext cx="19276200" cy="9106560"/>
           </a:xfrm>
           <a:prstGeom prst="rect">
             <a:avLst/>
@@ -14165,8 +14165,8 @@
         </p:nvSpPr>
         <p:spPr>
           <a:xfrm>
-            <a:off x="2194560" y="17674560"/>
-            <a:ext cx="19276200" cy="9106200"/>
+            <a:off x="2194560" y="17674920"/>
+            <a:ext cx="19276200" cy="9106560"/>
           </a:xfrm>
           <a:prstGeom prst="rect">
             <a:avLst/>
@@ -14333,7 +14333,7 @@
         <p:spPr>
           <a:xfrm>
             <a:off x="9980640" y="7702560"/>
-            <a:ext cx="23927400" cy="19090800"/>
+            <a:ext cx="23927040" cy="19090440"/>
           </a:xfrm>
           <a:prstGeom prst="rect">
             <a:avLst/>
@@ -14358,7 +14358,7 @@
         <p:spPr>
           <a:xfrm>
             <a:off x="9980640" y="7702560"/>
-            <a:ext cx="23927400" cy="19090800"/>
+            <a:ext cx="23927040" cy="19090440"/>
           </a:xfrm>
           <a:prstGeom prst="rect">
             <a:avLst/>
@@ -14581,7 +14581,7 @@
         <p:spPr>
           <a:xfrm>
             <a:off x="9980640" y="7702560"/>
-            <a:ext cx="23927400" cy="19090800"/>
+            <a:ext cx="23927040" cy="19090440"/>
           </a:xfrm>
           <a:prstGeom prst="rect">
             <a:avLst/>
@@ -14606,7 +14606,7 @@
         <p:spPr>
           <a:xfrm>
             <a:off x="9980640" y="7702560"/>
-            <a:ext cx="23927400" cy="19090800"/>
+            <a:ext cx="23927040" cy="19090440"/>
           </a:xfrm>
           <a:prstGeom prst="rect">
             <a:avLst/>
@@ -14629,7 +14629,7 @@
         <p:spPr>
           <a:xfrm>
             <a:off x="2194560" y="1313280"/>
-            <a:ext cx="39501000" cy="5496840"/>
+            <a:ext cx="39501360" cy="5496840"/>
           </a:xfrm>
           <a:prstGeom prst="rect">
             <a:avLst/>
@@ -14661,7 +14661,7 @@
         <p:spPr>
           <a:xfrm>
             <a:off x="2194560" y="7702560"/>
-            <a:ext cx="19276200" cy="9106200"/>
+            <a:ext cx="19276200" cy="9106560"/>
           </a:xfrm>
           <a:prstGeom prst="rect">
             <a:avLst/>
@@ -14782,7 +14782,7 @@
         <p:spPr>
           <a:xfrm>
             <a:off x="22435200" y="7702560"/>
-            <a:ext cx="19276200" cy="9106200"/>
+            <a:ext cx="19276200" cy="9106560"/>
           </a:xfrm>
           <a:prstGeom prst="rect">
             <a:avLst/>
@@ -14902,8 +14902,8 @@
         </p:nvSpPr>
         <p:spPr>
           <a:xfrm>
-            <a:off x="22435200" y="17674560"/>
-            <a:ext cx="19276200" cy="9106200"/>
+            <a:off x="22435200" y="17674920"/>
+            <a:ext cx="19276200" cy="9106560"/>
           </a:xfrm>
           <a:prstGeom prst="rect">
             <a:avLst/>
@@ -15023,8 +15023,8 @@
         </p:nvSpPr>
         <p:spPr>
           <a:xfrm>
-            <a:off x="2194560" y="17674560"/>
-            <a:ext cx="19276200" cy="9106200"/>
+            <a:off x="2194560" y="17674920"/>
+            <a:ext cx="19276200" cy="9106560"/>
           </a:xfrm>
           <a:prstGeom prst="rect">
             <a:avLst/>
@@ -15178,7 +15178,7 @@
         <p:spPr>
           <a:xfrm>
             <a:off x="32058720" y="20970360"/>
-            <a:ext cx="11830680" cy="11946240"/>
+            <a:ext cx="11830320" cy="11945880"/>
           </a:xfrm>
           <a:prstGeom prst="rect">
             <a:avLst/>
@@ -15200,7 +15200,7 @@
         <p:spPr>
           <a:xfrm>
             <a:off x="32058720" y="5105520"/>
-            <a:ext cx="11830680" cy="16000200"/>
+            <a:ext cx="11830320" cy="15999840"/>
           </a:xfrm>
           <a:prstGeom prst="rect">
             <a:avLst/>
@@ -15222,7 +15222,7 @@
         <p:spPr>
           <a:xfrm>
             <a:off x="12268080" y="5105520"/>
-            <a:ext cx="19584720" cy="27811080"/>
+            <a:ext cx="19584360" cy="27810720"/>
           </a:xfrm>
           <a:prstGeom prst="rect">
             <a:avLst/>
@@ -15242,7 +15242,7 @@
         <p:spPr>
           <a:xfrm>
             <a:off x="0" y="5105520"/>
-            <a:ext cx="12076920" cy="27811080"/>
+            <a:ext cx="12076560" cy="27810720"/>
           </a:xfrm>
           <a:prstGeom prst="rect">
             <a:avLst/>
@@ -15264,7 +15264,7 @@
         <p:spPr>
           <a:xfrm>
             <a:off x="0" y="0"/>
-            <a:ext cx="43878240" cy="3157200"/>
+            <a:ext cx="43877880" cy="3156840"/>
           </a:xfrm>
           <a:prstGeom prst="rect">
             <a:avLst/>
@@ -15305,7 +15305,7 @@
         <p:spPr>
           <a:xfrm>
             <a:off x="0" y="5105520"/>
-            <a:ext cx="12076920" cy="1004040"/>
+            <a:ext cx="12076560" cy="1003680"/>
           </a:xfrm>
           <a:prstGeom prst="rect">
             <a:avLst/>
@@ -15348,7 +15348,7 @@
         <p:spPr>
           <a:xfrm>
             <a:off x="32058720" y="21793320"/>
-            <a:ext cx="11830680" cy="1004040"/>
+            <a:ext cx="11830320" cy="1003680"/>
           </a:xfrm>
           <a:prstGeom prst="rect">
             <a:avLst/>
@@ -15391,7 +15391,7 @@
         <p:spPr>
           <a:xfrm>
             <a:off x="11160" y="3124080"/>
-            <a:ext cx="43878240" cy="1792080"/>
+            <a:ext cx="43877880" cy="1791720"/>
           </a:xfrm>
           <a:prstGeom prst="rect">
             <a:avLst/>
@@ -15580,7 +15580,7 @@
         <p:spPr>
           <a:xfrm>
             <a:off x="-43200" y="10013040"/>
-            <a:ext cx="12076920" cy="1004040"/>
+            <a:ext cx="12076560" cy="1003680"/>
           </a:xfrm>
           <a:prstGeom prst="rect">
             <a:avLst/>
@@ -15623,7 +15623,7 @@
         <p:spPr>
           <a:xfrm>
             <a:off x="5092200" y="10103040"/>
-            <a:ext cx="183240" cy="312120"/>
+            <a:ext cx="182880" cy="311760"/>
           </a:xfrm>
           <a:prstGeom prst="rect">
             <a:avLst/>
@@ -15643,7 +15643,7 @@
         <p:spPr>
           <a:xfrm>
             <a:off x="5290200" y="10023120"/>
-            <a:ext cx="181080" cy="312120"/>
+            <a:ext cx="180720" cy="311760"/>
           </a:xfrm>
           <a:prstGeom prst="rect">
             <a:avLst/>
@@ -15663,7 +15663,7 @@
         <p:spPr>
           <a:xfrm>
             <a:off x="77040" y="13716000"/>
-            <a:ext cx="11142720" cy="2071080"/>
+            <a:ext cx="11142360" cy="2070720"/>
           </a:xfrm>
           <a:prstGeom prst="rect">
             <a:avLst/>
@@ -15683,7 +15683,7 @@
         <p:spPr>
           <a:xfrm>
             <a:off x="0" y="23743800"/>
-            <a:ext cx="12077280" cy="1004040"/>
+            <a:ext cx="12076920" cy="1003680"/>
           </a:xfrm>
           <a:prstGeom prst="rect">
             <a:avLst/>
@@ -15726,7 +15726,7 @@
         <p:spPr>
           <a:xfrm>
             <a:off x="12192120" y="6190560"/>
-            <a:ext cx="19649880" cy="14381640"/>
+            <a:ext cx="19649520" cy="14381280"/>
           </a:xfrm>
           <a:prstGeom prst="rect">
             <a:avLst/>
@@ -15746,7 +15746,7 @@
         <p:spPr>
           <a:xfrm>
             <a:off x="12482280" y="27419400"/>
-            <a:ext cx="19657800" cy="1004040"/>
+            <a:ext cx="19657440" cy="1003680"/>
           </a:xfrm>
           <a:prstGeom prst="rect">
             <a:avLst/>
@@ -15797,7 +15797,7 @@
         <p:spPr>
           <a:xfrm>
             <a:off x="32004000" y="6019920"/>
-            <a:ext cx="11880000" cy="2217240"/>
+            <a:ext cx="11879640" cy="2216880"/>
           </a:xfrm>
           <a:prstGeom prst="rect">
             <a:avLst/>
@@ -15826,7 +15826,28 @@
                 <a:latin typeface="Century Gothic"/>
                 <a:ea typeface="Times New Roman"/>
               </a:rPr>
-              <a:t>tttt</a:t>
+              <a:t>Pages were from a single call of shrink_page_list.</a:t>
+            </a:r>
+            <a:endParaRPr/>
+          </a:p>
+          <a:p>
+            <a:pPr lvl="4">
+              <a:lnSpc>
+                <a:spcPct val="100000"/>
+              </a:lnSpc>
+              <a:buSzPct val="120000"/>
+              <a:buFont typeface="Arial"/>
+              <a:buChar char="•"/>
+            </a:pPr>
+            <a:r>
+              <a:rPr lang="en-US" sz="3200">
+                <a:solidFill>
+                  <a:srgbClr val="000000"/>
+                </a:solidFill>
+                <a:latin typeface="Century Gothic"/>
+                <a:ea typeface="Times New Roman"/>
+              </a:rPr>
+              <a:t>Number of pages found in each VMA:</a:t>
             </a:r>
             <a:endParaRPr/>
           </a:p>
@@ -15840,8 +15861,8 @@
         </p:nvSpPr>
         <p:spPr>
           <a:xfrm>
-            <a:off x="32058720" y="8229600"/>
-            <a:ext cx="11830680" cy="1004040"/>
+            <a:off x="32060880" y="13898880"/>
+            <a:ext cx="11830320" cy="1003680"/>
           </a:xfrm>
           <a:prstGeom prst="rect">
             <a:avLst/>
@@ -15884,7 +15905,7 @@
         <p:spPr>
           <a:xfrm>
             <a:off x="0" y="17891640"/>
-            <a:ext cx="12076920" cy="1004040"/>
+            <a:ext cx="12076560" cy="1003680"/>
           </a:xfrm>
           <a:prstGeom prst="rect">
             <a:avLst/>
@@ -15927,7 +15948,7 @@
         <p:spPr>
           <a:xfrm>
             <a:off x="32058720" y="5105520"/>
-            <a:ext cx="11830680" cy="1004040"/>
+            <a:ext cx="11830320" cy="1003680"/>
           </a:xfrm>
           <a:prstGeom prst="rect">
             <a:avLst/>
@@ -15976,7 +15997,7 @@
         <p:spPr>
           <a:xfrm>
             <a:off x="36717120" y="3218040"/>
-            <a:ext cx="6410160" cy="1657080"/>
+            <a:ext cx="6409800" cy="1656720"/>
           </a:xfrm>
           <a:prstGeom prst="rect">
             <a:avLst/>
@@ -15995,7 +16016,7 @@
         <p:spPr>
           <a:xfrm>
             <a:off x="548640" y="11163240"/>
-            <a:ext cx="11154600" cy="3100320"/>
+            <a:ext cx="11154240" cy="3099960"/>
           </a:xfrm>
           <a:prstGeom prst="rect">
             <a:avLst/>
@@ -16121,8 +16142,8 @@
         </p:nvSpPr>
         <p:spPr>
           <a:xfrm>
-            <a:off x="33026040" y="11860560"/>
-            <a:ext cx="9896040" cy="6489720"/>
+            <a:off x="32532480" y="15303960"/>
+            <a:ext cx="9895680" cy="6489360"/>
           </a:xfrm>
           <a:prstGeom prst="rect">
             <a:avLst/>
@@ -16221,7 +16242,7 @@
         <p:spPr>
           <a:xfrm>
             <a:off x="457200" y="6111000"/>
-            <a:ext cx="11246040" cy="3251520"/>
+            <a:ext cx="11245680" cy="3251160"/>
           </a:xfrm>
           <a:prstGeom prst="rect">
             <a:avLst/>
@@ -16312,7 +16333,7 @@
         <p:spPr>
           <a:xfrm>
             <a:off x="518400" y="19058400"/>
-            <a:ext cx="11184840" cy="3251520"/>
+            <a:ext cx="11184480" cy="3251160"/>
           </a:xfrm>
           <a:prstGeom prst="rect">
             <a:avLst/>
@@ -16393,7 +16414,7 @@
         <p:spPr>
           <a:xfrm>
             <a:off x="792720" y="25146000"/>
-            <a:ext cx="10910520" cy="3251520"/>
+            <a:ext cx="10910160" cy="3251160"/>
           </a:xfrm>
           <a:prstGeom prst="rect">
             <a:avLst/>
@@ -16494,7 +16515,7 @@
         <p:spPr>
           <a:xfrm>
             <a:off x="32552640" y="23225760"/>
-            <a:ext cx="10881360" cy="3251520"/>
+            <a:ext cx="10881000" cy="3251160"/>
           </a:xfrm>
           <a:prstGeom prst="rect">
             <a:avLst/>
@@ -16537,7 +16558,7 @@
         <p:spPr>
           <a:xfrm>
             <a:off x="12265200" y="5106600"/>
-            <a:ext cx="19476000" cy="27811080"/>
+            <a:ext cx="19475640" cy="27810720"/>
           </a:xfrm>
           <a:prstGeom prst="rect">
             <a:avLst/>
@@ -16559,7 +16580,7 @@
         <p:spPr>
           <a:xfrm>
             <a:off x="12893040" y="6583680"/>
-            <a:ext cx="18104400" cy="3251520"/>
+            <a:ext cx="18104040" cy="3251160"/>
           </a:xfrm>
           <a:prstGeom prst="rect">
             <a:avLst/>
@@ -16682,7 +16703,7 @@
         <p:spPr>
           <a:xfrm>
             <a:off x="12265200" y="5105520"/>
-            <a:ext cx="19476000" cy="1004040"/>
+            <a:ext cx="19475640" cy="1003680"/>
           </a:xfrm>
           <a:prstGeom prst="rect">
             <a:avLst/>
@@ -16725,7 +16746,7 @@
         <p:spPr>
           <a:xfrm>
             <a:off x="12268440" y="20954880"/>
-            <a:ext cx="19472760" cy="1004040"/>
+            <a:ext cx="19472400" cy="1003680"/>
           </a:xfrm>
           <a:prstGeom prst="rect">
             <a:avLst/>
@@ -16768,7 +16789,7 @@
         <p:spPr>
           <a:xfrm>
             <a:off x="12264840" y="28483560"/>
-            <a:ext cx="19476360" cy="1004040"/>
+            <a:ext cx="19476000" cy="1003680"/>
           </a:xfrm>
           <a:prstGeom prst="rect">
             <a:avLst/>
@@ -16811,7 +16832,7 @@
         <p:spPr>
           <a:xfrm>
             <a:off x="12863520" y="22168080"/>
-            <a:ext cx="18500040" cy="3251520"/>
+            <a:ext cx="18499680" cy="3251160"/>
           </a:xfrm>
           <a:prstGeom prst="rect">
             <a:avLst/>
@@ -16904,7 +16925,7 @@
         <p:spPr>
           <a:xfrm>
             <a:off x="12618720" y="29666160"/>
-            <a:ext cx="18500040" cy="3251520"/>
+            <a:ext cx="18499680" cy="3251160"/>
           </a:xfrm>
           <a:prstGeom prst="rect">
             <a:avLst/>
@@ -16958,6 +16979,31 @@
           </a:p>
         </p:txBody>
       </p:sp>
+      <p:pic>
+        <p:nvPicPr>
+          <p:cNvPr id="415" name="" descr=""/>
+          <p:cNvPicPr/>
+          <p:nvPr/>
+        </p:nvPicPr>
+        <p:blipFill>
+          <a:blip r:embed="rId2"/>
+          <a:stretch>
+            <a:fillRect/>
+          </a:stretch>
+        </p:blipFill>
+        <p:spPr>
+          <a:xfrm>
+            <a:off x="32058720" y="7680960"/>
+            <a:ext cx="11741040" cy="5810760"/>
+          </a:xfrm>
+          <a:prstGeom prst="rect">
+            <a:avLst/>
+          </a:prstGeom>
+          <a:ln>
+            <a:noFill/>
+          </a:ln>
+        </p:spPr>
+      </p:pic>
     </p:spTree>
   </p:cSld>
   <p:timing>
@@ -17009,14 +17055,14 @@
       </p:grpSpPr>
       <p:sp>
         <p:nvSpPr>
-          <p:cNvPr id="446" name="CustomShape 1"/>
+          <p:cNvPr id="447" name="CustomShape 1"/>
           <p:cNvSpPr/>
           <p:nvPr/>
         </p:nvSpPr>
         <p:spPr>
           <a:xfrm>
             <a:off x="2194560" y="1313280"/>
-            <a:ext cx="39501000" cy="5496480"/>
+            <a:ext cx="39500640" cy="5496120"/>
           </a:xfrm>
           <a:prstGeom prst="rect">
             <a:avLst/>
@@ -17029,14 +17075,14 @@
       </p:sp>
       <p:sp>
         <p:nvSpPr>
-          <p:cNvPr id="447" name="CustomShape 2"/>
+          <p:cNvPr id="448" name="CustomShape 2"/>
           <p:cNvSpPr/>
           <p:nvPr/>
         </p:nvSpPr>
         <p:spPr>
           <a:xfrm>
             <a:off x="2194560" y="7702560"/>
-            <a:ext cx="39501000" cy="19091520"/>
+            <a:ext cx="39500640" cy="19091160"/>
           </a:xfrm>
           <a:prstGeom prst="rect">
             <a:avLst/>
@@ -17049,14 +17095,14 @@
       </p:sp>
       <p:sp>
         <p:nvSpPr>
-          <p:cNvPr id="448" name="CustomShape 3"/>
+          <p:cNvPr id="449" name="CustomShape 3"/>
           <p:cNvSpPr/>
           <p:nvPr/>
         </p:nvSpPr>
         <p:spPr>
           <a:xfrm>
             <a:off x="2194560" y="7702560"/>
-            <a:ext cx="39501000" cy="19091520"/>
+            <a:ext cx="39500640" cy="19091160"/>
           </a:xfrm>
           <a:prstGeom prst="rect">
             <a:avLst/>
@@ -17069,7 +17115,7 @@
       </p:sp>
       <p:pic>
         <p:nvPicPr>
-          <p:cNvPr id="449" name="" descr=""/>
+          <p:cNvPr id="450" name="" descr=""/>
           <p:cNvPicPr/>
           <p:nvPr/>
         </p:nvPicPr>
@@ -17082,7 +17128,7 @@
         <p:spPr>
           <a:xfrm>
             <a:off x="9980640" y="7702560"/>
-            <a:ext cx="23928120" cy="19091520"/>
+            <a:ext cx="23927760" cy="19091160"/>
           </a:xfrm>
           <a:prstGeom prst="rect">
             <a:avLst/>
@@ -17094,7 +17140,7 @@
       </p:pic>
       <p:pic>
         <p:nvPicPr>
-          <p:cNvPr id="450" name="" descr=""/>
+          <p:cNvPr id="451" name="" descr=""/>
           <p:cNvPicPr/>
           <p:nvPr/>
         </p:nvPicPr>
@@ -17107,7 +17153,7 @@
         <p:spPr>
           <a:xfrm>
             <a:off x="9980640" y="7702560"/>
-            <a:ext cx="23928120" cy="19091520"/>
+            <a:ext cx="23927760" cy="19091160"/>
           </a:xfrm>
           <a:prstGeom prst="rect">
             <a:avLst/>
@@ -17141,14 +17187,14 @@
       </p:grpSpPr>
       <p:sp>
         <p:nvSpPr>
-          <p:cNvPr id="415" name="CustomShape 1"/>
+          <p:cNvPr id="416" name="CustomShape 1"/>
           <p:cNvSpPr/>
           <p:nvPr/>
         </p:nvSpPr>
         <p:spPr>
           <a:xfrm>
             <a:off x="2194560" y="1313280"/>
-            <a:ext cx="39500280" cy="25480440"/>
+            <a:ext cx="39499920" cy="25480080"/>
           </a:xfrm>
           <a:prstGeom prst="rect">
             <a:avLst/>
@@ -17183,14 +17229,14 @@
       </p:grpSpPr>
       <p:sp>
         <p:nvSpPr>
-          <p:cNvPr id="416" name="CustomShape 1"/>
+          <p:cNvPr id="417" name="CustomShape 1"/>
           <p:cNvSpPr/>
           <p:nvPr/>
         </p:nvSpPr>
         <p:spPr>
           <a:xfrm>
             <a:off x="2194560" y="1313280"/>
-            <a:ext cx="39500280" cy="5495760"/>
+            <a:ext cx="39499920" cy="5495400"/>
           </a:xfrm>
           <a:prstGeom prst="rect">
             <a:avLst/>
@@ -17203,14 +17249,14 @@
       </p:sp>
       <p:sp>
         <p:nvSpPr>
-          <p:cNvPr id="417" name="CustomShape 2"/>
+          <p:cNvPr id="418" name="CustomShape 2"/>
           <p:cNvSpPr/>
           <p:nvPr/>
         </p:nvSpPr>
         <p:spPr>
           <a:xfrm>
             <a:off x="2194560" y="7702560"/>
-            <a:ext cx="19275120" cy="9105480"/>
+            <a:ext cx="19274760" cy="9105120"/>
           </a:xfrm>
           <a:prstGeom prst="rect">
             <a:avLst/>
@@ -17223,14 +17269,14 @@
       </p:sp>
       <p:sp>
         <p:nvSpPr>
-          <p:cNvPr id="418" name="CustomShape 3"/>
+          <p:cNvPr id="419" name="CustomShape 3"/>
           <p:cNvSpPr/>
           <p:nvPr/>
         </p:nvSpPr>
         <p:spPr>
           <a:xfrm>
             <a:off x="2194560" y="17674920"/>
-            <a:ext cx="19275120" cy="9105480"/>
+            <a:ext cx="19274760" cy="9105120"/>
           </a:xfrm>
           <a:prstGeom prst="rect">
             <a:avLst/>
@@ -17243,14 +17289,14 @@
       </p:sp>
       <p:sp>
         <p:nvSpPr>
-          <p:cNvPr id="419" name="CustomShape 4"/>
+          <p:cNvPr id="420" name="CustomShape 4"/>
           <p:cNvSpPr/>
           <p:nvPr/>
         </p:nvSpPr>
         <p:spPr>
           <a:xfrm>
             <a:off x="22435200" y="7702560"/>
-            <a:ext cx="19275120" cy="19090800"/>
+            <a:ext cx="19274760" cy="19090440"/>
           </a:xfrm>
           <a:prstGeom prst="rect">
             <a:avLst/>
@@ -17285,14 +17331,14 @@
       </p:grpSpPr>
       <p:sp>
         <p:nvSpPr>
-          <p:cNvPr id="420" name="CustomShape 1"/>
+          <p:cNvPr id="421" name="CustomShape 1"/>
           <p:cNvSpPr/>
           <p:nvPr/>
         </p:nvSpPr>
         <p:spPr>
           <a:xfrm>
             <a:off x="2194560" y="1313280"/>
-            <a:ext cx="39500280" cy="5495760"/>
+            <a:ext cx="39499920" cy="5495400"/>
           </a:xfrm>
           <a:prstGeom prst="rect">
             <a:avLst/>
@@ -17305,14 +17351,14 @@
       </p:sp>
       <p:sp>
         <p:nvSpPr>
-          <p:cNvPr id="421" name="CustomShape 2"/>
+          <p:cNvPr id="422" name="CustomShape 2"/>
           <p:cNvSpPr/>
           <p:nvPr/>
         </p:nvSpPr>
         <p:spPr>
           <a:xfrm>
             <a:off x="2194560" y="7702560"/>
-            <a:ext cx="19275120" cy="19090800"/>
+            <a:ext cx="19274760" cy="19090440"/>
           </a:xfrm>
           <a:prstGeom prst="rect">
             <a:avLst/>
@@ -17325,14 +17371,14 @@
       </p:sp>
       <p:sp>
         <p:nvSpPr>
-          <p:cNvPr id="422" name="CustomShape 3"/>
+          <p:cNvPr id="423" name="CustomShape 3"/>
           <p:cNvSpPr/>
           <p:nvPr/>
         </p:nvSpPr>
         <p:spPr>
           <a:xfrm>
             <a:off x="22435200" y="7702560"/>
-            <a:ext cx="19275120" cy="9105480"/>
+            <a:ext cx="19274760" cy="9105120"/>
           </a:xfrm>
           <a:prstGeom prst="rect">
             <a:avLst/>
@@ -17345,14 +17391,14 @@
       </p:sp>
       <p:sp>
         <p:nvSpPr>
-          <p:cNvPr id="423" name="CustomShape 4"/>
+          <p:cNvPr id="424" name="CustomShape 4"/>
           <p:cNvSpPr/>
           <p:nvPr/>
         </p:nvSpPr>
         <p:spPr>
           <a:xfrm>
             <a:off x="22435200" y="17674920"/>
-            <a:ext cx="19275120" cy="9105480"/>
+            <a:ext cx="19274760" cy="9105120"/>
           </a:xfrm>
           <a:prstGeom prst="rect">
             <a:avLst/>
@@ -17387,14 +17433,14 @@
       </p:grpSpPr>
       <p:sp>
         <p:nvSpPr>
-          <p:cNvPr id="424" name="CustomShape 1"/>
+          <p:cNvPr id="425" name="CustomShape 1"/>
           <p:cNvSpPr/>
           <p:nvPr/>
         </p:nvSpPr>
         <p:spPr>
           <a:xfrm>
             <a:off x="2194560" y="1313280"/>
-            <a:ext cx="39500280" cy="5495760"/>
+            <a:ext cx="39499920" cy="5495400"/>
           </a:xfrm>
           <a:prstGeom prst="rect">
             <a:avLst/>
@@ -17407,14 +17453,14 @@
       </p:sp>
       <p:sp>
         <p:nvSpPr>
-          <p:cNvPr id="425" name="CustomShape 2"/>
+          <p:cNvPr id="426" name="CustomShape 2"/>
           <p:cNvSpPr/>
           <p:nvPr/>
         </p:nvSpPr>
         <p:spPr>
           <a:xfrm>
             <a:off x="2194560" y="7702560"/>
-            <a:ext cx="19275120" cy="9105480"/>
+            <a:ext cx="19274760" cy="9105120"/>
           </a:xfrm>
           <a:prstGeom prst="rect">
             <a:avLst/>
@@ -17427,14 +17473,14 @@
       </p:sp>
       <p:sp>
         <p:nvSpPr>
-          <p:cNvPr id="426" name="CustomShape 3"/>
+          <p:cNvPr id="427" name="CustomShape 3"/>
           <p:cNvSpPr/>
           <p:nvPr/>
         </p:nvSpPr>
         <p:spPr>
           <a:xfrm>
             <a:off x="22435200" y="7702560"/>
-            <a:ext cx="19275120" cy="9105480"/>
+            <a:ext cx="19274760" cy="9105120"/>
           </a:xfrm>
           <a:prstGeom prst="rect">
             <a:avLst/>
@@ -17447,14 +17493,14 @@
       </p:sp>
       <p:sp>
         <p:nvSpPr>
-          <p:cNvPr id="427" name="CustomShape 4"/>
+          <p:cNvPr id="428" name="CustomShape 4"/>
           <p:cNvSpPr/>
           <p:nvPr/>
         </p:nvSpPr>
         <p:spPr>
           <a:xfrm>
             <a:off x="2194560" y="17674920"/>
-            <a:ext cx="39500280" cy="9105480"/>
+            <a:ext cx="39499920" cy="9105120"/>
           </a:xfrm>
           <a:prstGeom prst="rect">
             <a:avLst/>
@@ -17489,14 +17535,14 @@
       </p:grpSpPr>
       <p:sp>
         <p:nvSpPr>
-          <p:cNvPr id="428" name="CustomShape 1"/>
+          <p:cNvPr id="429" name="CustomShape 1"/>
           <p:cNvSpPr/>
           <p:nvPr/>
         </p:nvSpPr>
         <p:spPr>
           <a:xfrm>
             <a:off x="2194560" y="1313280"/>
-            <a:ext cx="39500280" cy="5495760"/>
+            <a:ext cx="39499920" cy="5495400"/>
           </a:xfrm>
           <a:prstGeom prst="rect">
             <a:avLst/>
@@ -17509,14 +17555,14 @@
       </p:sp>
       <p:sp>
         <p:nvSpPr>
-          <p:cNvPr id="429" name="CustomShape 2"/>
+          <p:cNvPr id="430" name="CustomShape 2"/>
           <p:cNvSpPr/>
           <p:nvPr/>
         </p:nvSpPr>
         <p:spPr>
           <a:xfrm>
             <a:off x="2194560" y="7702560"/>
-            <a:ext cx="39500280" cy="9105480"/>
+            <a:ext cx="39499920" cy="9105120"/>
           </a:xfrm>
           <a:prstGeom prst="rect">
             <a:avLst/>
@@ -17529,14 +17575,14 @@
       </p:sp>
       <p:sp>
         <p:nvSpPr>
-          <p:cNvPr id="430" name="CustomShape 3"/>
+          <p:cNvPr id="431" name="CustomShape 3"/>
           <p:cNvSpPr/>
           <p:nvPr/>
         </p:nvSpPr>
         <p:spPr>
           <a:xfrm>
             <a:off x="2194560" y="17674920"/>
-            <a:ext cx="39500280" cy="9105480"/>
+            <a:ext cx="39499920" cy="9105120"/>
           </a:xfrm>
           <a:prstGeom prst="rect">
             <a:avLst/>
@@ -17571,14 +17617,14 @@
       </p:grpSpPr>
       <p:sp>
         <p:nvSpPr>
-          <p:cNvPr id="431" name="CustomShape 1"/>
+          <p:cNvPr id="432" name="CustomShape 1"/>
           <p:cNvSpPr/>
           <p:nvPr/>
         </p:nvSpPr>
         <p:spPr>
           <a:xfrm>
             <a:off x="2194560" y="1313280"/>
-            <a:ext cx="39500280" cy="5495760"/>
+            <a:ext cx="39499920" cy="5495400"/>
           </a:xfrm>
           <a:prstGeom prst="rect">
             <a:avLst/>
@@ -17591,14 +17637,14 @@
       </p:sp>
       <p:sp>
         <p:nvSpPr>
-          <p:cNvPr id="432" name="CustomShape 2"/>
+          <p:cNvPr id="433" name="CustomShape 2"/>
           <p:cNvSpPr/>
           <p:nvPr/>
         </p:nvSpPr>
         <p:spPr>
           <a:xfrm>
             <a:off x="2194560" y="7702560"/>
-            <a:ext cx="19275120" cy="9105480"/>
+            <a:ext cx="19274760" cy="9105120"/>
           </a:xfrm>
           <a:prstGeom prst="rect">
             <a:avLst/>
@@ -17611,14 +17657,14 @@
       </p:sp>
       <p:sp>
         <p:nvSpPr>
-          <p:cNvPr id="433" name="CustomShape 3"/>
+          <p:cNvPr id="434" name="CustomShape 3"/>
           <p:cNvSpPr/>
           <p:nvPr/>
         </p:nvSpPr>
         <p:spPr>
           <a:xfrm>
             <a:off x="22435200" y="7702560"/>
-            <a:ext cx="19275120" cy="9105480"/>
+            <a:ext cx="19274760" cy="9105120"/>
           </a:xfrm>
           <a:prstGeom prst="rect">
             <a:avLst/>
@@ -17631,14 +17677,14 @@
       </p:sp>
       <p:sp>
         <p:nvSpPr>
-          <p:cNvPr id="434" name="CustomShape 4"/>
+          <p:cNvPr id="435" name="CustomShape 4"/>
           <p:cNvSpPr/>
           <p:nvPr/>
         </p:nvSpPr>
         <p:spPr>
           <a:xfrm>
             <a:off x="22435200" y="17674920"/>
-            <a:ext cx="19275120" cy="9105480"/>
+            <a:ext cx="19274760" cy="9105120"/>
           </a:xfrm>
           <a:prstGeom prst="rect">
             <a:avLst/>
@@ -17651,14 +17697,14 @@
       </p:sp>
       <p:sp>
         <p:nvSpPr>
-          <p:cNvPr id="435" name="CustomShape 5"/>
+          <p:cNvPr id="436" name="CustomShape 5"/>
           <p:cNvSpPr/>
           <p:nvPr/>
         </p:nvSpPr>
         <p:spPr>
           <a:xfrm>
             <a:off x="2194560" y="17674920"/>
-            <a:ext cx="19275120" cy="9105480"/>
+            <a:ext cx="19274760" cy="9105120"/>
           </a:xfrm>
           <a:prstGeom prst="rect">
             <a:avLst/>
@@ -17693,14 +17739,14 @@
       </p:grpSpPr>
       <p:sp>
         <p:nvSpPr>
-          <p:cNvPr id="436" name="CustomShape 1"/>
+          <p:cNvPr id="437" name="CustomShape 1"/>
           <p:cNvSpPr/>
           <p:nvPr/>
         </p:nvSpPr>
         <p:spPr>
           <a:xfrm>
             <a:off x="2194560" y="1313280"/>
-            <a:ext cx="39500280" cy="5495760"/>
+            <a:ext cx="39499920" cy="5495400"/>
           </a:xfrm>
           <a:prstGeom prst="rect">
             <a:avLst/>
@@ -17713,14 +17759,14 @@
       </p:sp>
       <p:sp>
         <p:nvSpPr>
-          <p:cNvPr id="437" name="CustomShape 2"/>
+          <p:cNvPr id="438" name="CustomShape 2"/>
           <p:cNvSpPr/>
           <p:nvPr/>
         </p:nvSpPr>
         <p:spPr>
           <a:xfrm>
             <a:off x="2194560" y="7702560"/>
-            <a:ext cx="39500280" cy="19090800"/>
+            <a:ext cx="39499920" cy="19090440"/>
           </a:xfrm>
           <a:prstGeom prst="rect">
             <a:avLst/>
@@ -17733,14 +17779,14 @@
       </p:sp>
       <p:sp>
         <p:nvSpPr>
-          <p:cNvPr id="438" name="CustomShape 3"/>
+          <p:cNvPr id="439" name="CustomShape 3"/>
           <p:cNvSpPr/>
           <p:nvPr/>
         </p:nvSpPr>
         <p:spPr>
           <a:xfrm>
             <a:off x="2194560" y="7702560"/>
-            <a:ext cx="39500280" cy="19090800"/>
+            <a:ext cx="39499920" cy="19090440"/>
           </a:xfrm>
           <a:prstGeom prst="rect">
             <a:avLst/>
@@ -17753,7 +17799,7 @@
       </p:sp>
       <p:pic>
         <p:nvPicPr>
-          <p:cNvPr id="439" name="" descr=""/>
+          <p:cNvPr id="440" name="" descr=""/>
           <p:cNvPicPr/>
           <p:nvPr/>
         </p:nvPicPr>
@@ -17766,7 +17812,7 @@
         <p:spPr>
           <a:xfrm>
             <a:off x="9980640" y="7702560"/>
-            <a:ext cx="23927400" cy="19090800"/>
+            <a:ext cx="23927040" cy="19090440"/>
           </a:xfrm>
           <a:prstGeom prst="rect">
             <a:avLst/>
@@ -17778,7 +17824,7 @@
       </p:pic>
       <p:pic>
         <p:nvPicPr>
-          <p:cNvPr id="440" name="" descr=""/>
+          <p:cNvPr id="441" name="" descr=""/>
           <p:cNvPicPr/>
           <p:nvPr/>
         </p:nvPicPr>
@@ -17791,7 +17837,7 @@
         <p:spPr>
           <a:xfrm>
             <a:off x="9980640" y="7702560"/>
-            <a:ext cx="23927400" cy="19090800"/>
+            <a:ext cx="23927040" cy="19090440"/>
           </a:xfrm>
           <a:prstGeom prst="rect">
             <a:avLst/>
@@ -17825,14 +17871,14 @@
       </p:grpSpPr>
       <p:sp>
         <p:nvSpPr>
-          <p:cNvPr id="441" name="CustomShape 1"/>
+          <p:cNvPr id="442" name="CustomShape 1"/>
           <p:cNvSpPr/>
           <p:nvPr/>
         </p:nvSpPr>
         <p:spPr>
           <a:xfrm>
             <a:off x="2194560" y="1313280"/>
-            <a:ext cx="39501000" cy="5496480"/>
+            <a:ext cx="39500640" cy="5496120"/>
           </a:xfrm>
           <a:prstGeom prst="rect">
             <a:avLst/>
@@ -17845,14 +17891,14 @@
       </p:sp>
       <p:sp>
         <p:nvSpPr>
-          <p:cNvPr id="442" name="CustomShape 2"/>
+          <p:cNvPr id="443" name="CustomShape 2"/>
           <p:cNvSpPr/>
           <p:nvPr/>
         </p:nvSpPr>
         <p:spPr>
           <a:xfrm>
             <a:off x="2194560" y="7702560"/>
-            <a:ext cx="19275840" cy="9106200"/>
+            <a:ext cx="19275480" cy="9105840"/>
           </a:xfrm>
           <a:prstGeom prst="rect">
             <a:avLst/>
@@ -17865,14 +17911,14 @@
       </p:sp>
       <p:sp>
         <p:nvSpPr>
-          <p:cNvPr id="443" name="CustomShape 3"/>
+          <p:cNvPr id="444" name="CustomShape 3"/>
           <p:cNvSpPr/>
           <p:nvPr/>
         </p:nvSpPr>
         <p:spPr>
           <a:xfrm>
             <a:off x="22435200" y="7702560"/>
-            <a:ext cx="19275840" cy="9106200"/>
+            <a:ext cx="19275480" cy="9105840"/>
           </a:xfrm>
           <a:prstGeom prst="rect">
             <a:avLst/>
@@ -17885,14 +17931,14 @@
       </p:sp>
       <p:sp>
         <p:nvSpPr>
-          <p:cNvPr id="444" name="CustomShape 4"/>
+          <p:cNvPr id="445" name="CustomShape 4"/>
           <p:cNvSpPr/>
           <p:nvPr/>
         </p:nvSpPr>
         <p:spPr>
           <a:xfrm>
             <a:off x="22435200" y="17674920"/>
-            <a:ext cx="19275840" cy="9106200"/>
+            <a:ext cx="19275480" cy="9105840"/>
           </a:xfrm>
           <a:prstGeom prst="rect">
             <a:avLst/>
@@ -17905,14 +17951,14 @@
       </p:sp>
       <p:sp>
         <p:nvSpPr>
-          <p:cNvPr id="445" name="CustomShape 5"/>
+          <p:cNvPr id="446" name="CustomShape 5"/>
           <p:cNvSpPr/>
           <p:nvPr/>
         </p:nvSpPr>
         <p:spPr>
           <a:xfrm>
             <a:off x="2194560" y="17674920"/>
-            <a:ext cx="19275840" cy="9106200"/>
+            <a:ext cx="19275480" cy="9105840"/>
           </a:xfrm>
           <a:prstGeom prst="rect">
             <a:avLst/>

</xml_diff>

<commit_message>
Revised page-vs-VMA graph in poster.
</commit_message>
<xml_diff>
--- a/CF_Poster.pptx
+++ b/CF_Poster.pptx
@@ -202,7 +202,7 @@
           <a:bodyPr lIns="0" rIns="0" tIns="0" bIns="0" anchor="b"/>
           <a:p>
             <a:pPr algn="r"/>
-            <a:fld id="{D137C7B9-9C0A-4671-9D9B-BB28C38DFCFE}" type="slidenum">
+            <a:fld id="{5196FF0D-7EFD-40DB-AD1C-07E4E18EED89}" type="slidenum">
               <a:rPr lang="en-US" sz="1400">
                 <a:latin typeface="Times New Roman"/>
               </a:rPr>
@@ -244,7 +244,7 @@
         <p:spPr>
           <a:xfrm>
             <a:off x="4143600" y="9119520"/>
-            <a:ext cx="3167640" cy="477720"/>
+            <a:ext cx="3167280" cy="477360"/>
           </a:xfrm>
           <a:prstGeom prst="rect">
             <a:avLst/>
@@ -262,7 +262,7 @@
                 <a:spcPct val="100000"/>
               </a:lnSpc>
             </a:pPr>
-            <a:fld id="{5F9CA4CC-7D2D-4986-A62B-BC1943F8AE5F}" type="slidenum">
+            <a:fld id="{BF1EE4A6-75A0-4641-B5D0-29AF03C6A207}" type="slidenum">
               <a:rPr lang="en-US" sz="1200">
                 <a:solidFill>
                   <a:srgbClr val="000000"/>
@@ -289,7 +289,7 @@
         <p:spPr>
           <a:xfrm>
             <a:off x="731520" y="4561560"/>
-            <a:ext cx="5850000" cy="4318200"/>
+            <a:ext cx="5849640" cy="4317840"/>
           </a:xfrm>
           <a:prstGeom prst="rect">
             <a:avLst/>
@@ -12124,7 +12124,7 @@
         <p:spPr>
           <a:xfrm>
             <a:off x="9980640" y="7702560"/>
-            <a:ext cx="23927040" cy="19090440"/>
+            <a:ext cx="23926680" cy="19090080"/>
           </a:xfrm>
           <a:prstGeom prst="rect">
             <a:avLst/>
@@ -12149,7 +12149,7 @@
         <p:spPr>
           <a:xfrm>
             <a:off x="9980640" y="7702560"/>
-            <a:ext cx="23927040" cy="19090440"/>
+            <a:ext cx="23926680" cy="19090080"/>
           </a:xfrm>
           <a:prstGeom prst="rect">
             <a:avLst/>
@@ -12174,7 +12174,7 @@
         <p:spPr>
           <a:xfrm>
             <a:off x="9980640" y="7702560"/>
-            <a:ext cx="23927760" cy="19091160"/>
+            <a:ext cx="23927400" cy="19090800"/>
           </a:xfrm>
           <a:prstGeom prst="rect">
             <a:avLst/>
@@ -12199,7 +12199,7 @@
         <p:spPr>
           <a:xfrm>
             <a:off x="9980640" y="7702560"/>
-            <a:ext cx="23927760" cy="19091160"/>
+            <a:ext cx="23927400" cy="19090800"/>
           </a:xfrm>
           <a:prstGeom prst="rect">
             <a:avLst/>
@@ -14333,7 +14333,7 @@
         <p:spPr>
           <a:xfrm>
             <a:off x="9980640" y="7702560"/>
-            <a:ext cx="23927040" cy="19090440"/>
+            <a:ext cx="23926680" cy="19090080"/>
           </a:xfrm>
           <a:prstGeom prst="rect">
             <a:avLst/>
@@ -14358,7 +14358,7 @@
         <p:spPr>
           <a:xfrm>
             <a:off x="9980640" y="7702560"/>
-            <a:ext cx="23927040" cy="19090440"/>
+            <a:ext cx="23926680" cy="19090080"/>
           </a:xfrm>
           <a:prstGeom prst="rect">
             <a:avLst/>
@@ -14581,7 +14581,7 @@
         <p:spPr>
           <a:xfrm>
             <a:off x="9980640" y="7702560"/>
-            <a:ext cx="23927040" cy="19090440"/>
+            <a:ext cx="23926680" cy="19090080"/>
           </a:xfrm>
           <a:prstGeom prst="rect">
             <a:avLst/>
@@ -14606,7 +14606,7 @@
         <p:spPr>
           <a:xfrm>
             <a:off x="9980640" y="7702560"/>
-            <a:ext cx="23927040" cy="19090440"/>
+            <a:ext cx="23926680" cy="19090080"/>
           </a:xfrm>
           <a:prstGeom prst="rect">
             <a:avLst/>
@@ -15178,7 +15178,7 @@
         <p:spPr>
           <a:xfrm>
             <a:off x="32058720" y="20970360"/>
-            <a:ext cx="11830320" cy="11945880"/>
+            <a:ext cx="11829960" cy="11945520"/>
           </a:xfrm>
           <a:prstGeom prst="rect">
             <a:avLst/>
@@ -15200,7 +15200,7 @@
         <p:spPr>
           <a:xfrm>
             <a:off x="32058720" y="5105520"/>
-            <a:ext cx="11830320" cy="15999840"/>
+            <a:ext cx="11829960" cy="15999480"/>
           </a:xfrm>
           <a:prstGeom prst="rect">
             <a:avLst/>
@@ -15222,7 +15222,7 @@
         <p:spPr>
           <a:xfrm>
             <a:off x="12268080" y="5105520"/>
-            <a:ext cx="19584360" cy="27810720"/>
+            <a:ext cx="19584000" cy="27810360"/>
           </a:xfrm>
           <a:prstGeom prst="rect">
             <a:avLst/>
@@ -15242,7 +15242,7 @@
         <p:spPr>
           <a:xfrm>
             <a:off x="0" y="5105520"/>
-            <a:ext cx="12076560" cy="27810720"/>
+            <a:ext cx="12076200" cy="27810360"/>
           </a:xfrm>
           <a:prstGeom prst="rect">
             <a:avLst/>
@@ -15264,7 +15264,7 @@
         <p:spPr>
           <a:xfrm>
             <a:off x="0" y="0"/>
-            <a:ext cx="43877880" cy="3156840"/>
+            <a:ext cx="43877520" cy="3156480"/>
           </a:xfrm>
           <a:prstGeom prst="rect">
             <a:avLst/>
@@ -15305,7 +15305,7 @@
         <p:spPr>
           <a:xfrm>
             <a:off x="0" y="5105520"/>
-            <a:ext cx="12076560" cy="1003680"/>
+            <a:ext cx="12076200" cy="1003320"/>
           </a:xfrm>
           <a:prstGeom prst="rect">
             <a:avLst/>
@@ -15348,7 +15348,7 @@
         <p:spPr>
           <a:xfrm>
             <a:off x="32058720" y="21793320"/>
-            <a:ext cx="11830320" cy="1003680"/>
+            <a:ext cx="11829960" cy="1003320"/>
           </a:xfrm>
           <a:prstGeom prst="rect">
             <a:avLst/>
@@ -15391,7 +15391,7 @@
         <p:spPr>
           <a:xfrm>
             <a:off x="11160" y="3124080"/>
-            <a:ext cx="43877880" cy="1791720"/>
+            <a:ext cx="43877520" cy="1791360"/>
           </a:xfrm>
           <a:prstGeom prst="rect">
             <a:avLst/>
@@ -15580,7 +15580,7 @@
         <p:spPr>
           <a:xfrm>
             <a:off x="-43200" y="10013040"/>
-            <a:ext cx="12076560" cy="1003680"/>
+            <a:ext cx="12076200" cy="1003320"/>
           </a:xfrm>
           <a:prstGeom prst="rect">
             <a:avLst/>
@@ -15623,7 +15623,7 @@
         <p:spPr>
           <a:xfrm>
             <a:off x="5092200" y="10103040"/>
-            <a:ext cx="182880" cy="311760"/>
+            <a:ext cx="182520" cy="311400"/>
           </a:xfrm>
           <a:prstGeom prst="rect">
             <a:avLst/>
@@ -15643,7 +15643,7 @@
         <p:spPr>
           <a:xfrm>
             <a:off x="5290200" y="10023120"/>
-            <a:ext cx="180720" cy="311760"/>
+            <a:ext cx="180360" cy="311400"/>
           </a:xfrm>
           <a:prstGeom prst="rect">
             <a:avLst/>
@@ -15663,7 +15663,7 @@
         <p:spPr>
           <a:xfrm>
             <a:off x="77040" y="13716000"/>
-            <a:ext cx="11142360" cy="2070720"/>
+            <a:ext cx="11142000" cy="2070360"/>
           </a:xfrm>
           <a:prstGeom prst="rect">
             <a:avLst/>
@@ -15683,7 +15683,7 @@
         <p:spPr>
           <a:xfrm>
             <a:off x="0" y="23743800"/>
-            <a:ext cx="12076920" cy="1003680"/>
+            <a:ext cx="12076560" cy="1003320"/>
           </a:xfrm>
           <a:prstGeom prst="rect">
             <a:avLst/>
@@ -15726,7 +15726,7 @@
         <p:spPr>
           <a:xfrm>
             <a:off x="12192120" y="6190560"/>
-            <a:ext cx="19649520" cy="14381280"/>
+            <a:ext cx="19649160" cy="14380920"/>
           </a:xfrm>
           <a:prstGeom prst="rect">
             <a:avLst/>
@@ -15746,7 +15746,7 @@
         <p:spPr>
           <a:xfrm>
             <a:off x="12482280" y="27419400"/>
-            <a:ext cx="19657440" cy="1003680"/>
+            <a:ext cx="19657080" cy="1003320"/>
           </a:xfrm>
           <a:prstGeom prst="rect">
             <a:avLst/>
@@ -15797,7 +15797,7 @@
         <p:spPr>
           <a:xfrm>
             <a:off x="32004000" y="6019920"/>
-            <a:ext cx="11879640" cy="2216880"/>
+            <a:ext cx="11879280" cy="2216520"/>
           </a:xfrm>
           <a:prstGeom prst="rect">
             <a:avLst/>
@@ -15862,7 +15862,7 @@
         <p:spPr>
           <a:xfrm>
             <a:off x="32060880" y="13898880"/>
-            <a:ext cx="11830320" cy="1003680"/>
+            <a:ext cx="11829960" cy="1003320"/>
           </a:xfrm>
           <a:prstGeom prst="rect">
             <a:avLst/>
@@ -15905,7 +15905,7 @@
         <p:spPr>
           <a:xfrm>
             <a:off x="0" y="17891640"/>
-            <a:ext cx="12076560" cy="1003680"/>
+            <a:ext cx="12076200" cy="1003320"/>
           </a:xfrm>
           <a:prstGeom prst="rect">
             <a:avLst/>
@@ -15948,7 +15948,7 @@
         <p:spPr>
           <a:xfrm>
             <a:off x="32058720" y="5105520"/>
-            <a:ext cx="11830320" cy="1003680"/>
+            <a:ext cx="11829960" cy="1003320"/>
           </a:xfrm>
           <a:prstGeom prst="rect">
             <a:avLst/>
@@ -15997,7 +15997,7 @@
         <p:spPr>
           <a:xfrm>
             <a:off x="36717120" y="3218040"/>
-            <a:ext cx="6409800" cy="1656720"/>
+            <a:ext cx="6409440" cy="1656360"/>
           </a:xfrm>
           <a:prstGeom prst="rect">
             <a:avLst/>
@@ -16016,7 +16016,7 @@
         <p:spPr>
           <a:xfrm>
             <a:off x="548640" y="11163240"/>
-            <a:ext cx="11154240" cy="3099960"/>
+            <a:ext cx="11153880" cy="3099600"/>
           </a:xfrm>
           <a:prstGeom prst="rect">
             <a:avLst/>
@@ -16143,7 +16143,7 @@
         <p:spPr>
           <a:xfrm>
             <a:off x="32532480" y="15303960"/>
-            <a:ext cx="9895680" cy="6489360"/>
+            <a:ext cx="9895320" cy="6489000"/>
           </a:xfrm>
           <a:prstGeom prst="rect">
             <a:avLst/>
@@ -16242,7 +16242,7 @@
         <p:spPr>
           <a:xfrm>
             <a:off x="457200" y="6111000"/>
-            <a:ext cx="11245680" cy="3251160"/>
+            <a:ext cx="11245320" cy="3250800"/>
           </a:xfrm>
           <a:prstGeom prst="rect">
             <a:avLst/>
@@ -16333,7 +16333,7 @@
         <p:spPr>
           <a:xfrm>
             <a:off x="518400" y="19058400"/>
-            <a:ext cx="11184480" cy="3251160"/>
+            <a:ext cx="11184120" cy="3250800"/>
           </a:xfrm>
           <a:prstGeom prst="rect">
             <a:avLst/>
@@ -16414,7 +16414,7 @@
         <p:spPr>
           <a:xfrm>
             <a:off x="792720" y="25146000"/>
-            <a:ext cx="10910160" cy="3251160"/>
+            <a:ext cx="10909800" cy="3250800"/>
           </a:xfrm>
           <a:prstGeom prst="rect">
             <a:avLst/>
@@ -16515,7 +16515,7 @@
         <p:spPr>
           <a:xfrm>
             <a:off x="32552640" y="23225760"/>
-            <a:ext cx="10881000" cy="3251160"/>
+            <a:ext cx="10880640" cy="3250800"/>
           </a:xfrm>
           <a:prstGeom prst="rect">
             <a:avLst/>
@@ -16558,7 +16558,7 @@
         <p:spPr>
           <a:xfrm>
             <a:off x="12265200" y="5106600"/>
-            <a:ext cx="19475640" cy="27810720"/>
+            <a:ext cx="19475280" cy="27810360"/>
           </a:xfrm>
           <a:prstGeom prst="rect">
             <a:avLst/>
@@ -16580,7 +16580,7 @@
         <p:spPr>
           <a:xfrm>
             <a:off x="12893040" y="6583680"/>
-            <a:ext cx="18104040" cy="3251160"/>
+            <a:ext cx="18103680" cy="3250800"/>
           </a:xfrm>
           <a:prstGeom prst="rect">
             <a:avLst/>
@@ -16703,7 +16703,7 @@
         <p:spPr>
           <a:xfrm>
             <a:off x="12265200" y="5105520"/>
-            <a:ext cx="19475640" cy="1003680"/>
+            <a:ext cx="19475280" cy="1003320"/>
           </a:xfrm>
           <a:prstGeom prst="rect">
             <a:avLst/>
@@ -16746,7 +16746,7 @@
         <p:spPr>
           <a:xfrm>
             <a:off x="12268440" y="20954880"/>
-            <a:ext cx="19472400" cy="1003680"/>
+            <a:ext cx="19472040" cy="1003320"/>
           </a:xfrm>
           <a:prstGeom prst="rect">
             <a:avLst/>
@@ -16789,7 +16789,7 @@
         <p:spPr>
           <a:xfrm>
             <a:off x="12264840" y="28483560"/>
-            <a:ext cx="19476000" cy="1003680"/>
+            <a:ext cx="19475640" cy="1003320"/>
           </a:xfrm>
           <a:prstGeom prst="rect">
             <a:avLst/>
@@ -16832,7 +16832,7 @@
         <p:spPr>
           <a:xfrm>
             <a:off x="12863520" y="22168080"/>
-            <a:ext cx="18499680" cy="3251160"/>
+            <a:ext cx="18499320" cy="3250800"/>
           </a:xfrm>
           <a:prstGeom prst="rect">
             <a:avLst/>
@@ -16925,7 +16925,7 @@
         <p:spPr>
           <a:xfrm>
             <a:off x="12618720" y="29666160"/>
-            <a:ext cx="18499680" cy="3251160"/>
+            <a:ext cx="18499320" cy="3250800"/>
           </a:xfrm>
           <a:prstGeom prst="rect">
             <a:avLst/>
@@ -16993,8 +16993,8 @@
         </p:blipFill>
         <p:spPr>
           <a:xfrm>
-            <a:off x="32058720" y="7680960"/>
-            <a:ext cx="11741040" cy="5810760"/>
+            <a:off x="32194800" y="7680960"/>
+            <a:ext cx="11693880" cy="6217920"/>
           </a:xfrm>
           <a:prstGeom prst="rect">
             <a:avLst/>
@@ -17062,7 +17062,7 @@
         <p:spPr>
           <a:xfrm>
             <a:off x="2194560" y="1313280"/>
-            <a:ext cx="39500640" cy="5496120"/>
+            <a:ext cx="39500280" cy="5495760"/>
           </a:xfrm>
           <a:prstGeom prst="rect">
             <a:avLst/>
@@ -17082,7 +17082,7 @@
         <p:spPr>
           <a:xfrm>
             <a:off x="2194560" y="7702560"/>
-            <a:ext cx="39500640" cy="19091160"/>
+            <a:ext cx="39500280" cy="19090800"/>
           </a:xfrm>
           <a:prstGeom prst="rect">
             <a:avLst/>
@@ -17102,7 +17102,7 @@
         <p:spPr>
           <a:xfrm>
             <a:off x="2194560" y="7702560"/>
-            <a:ext cx="39500640" cy="19091160"/>
+            <a:ext cx="39500280" cy="19090800"/>
           </a:xfrm>
           <a:prstGeom prst="rect">
             <a:avLst/>
@@ -17128,7 +17128,7 @@
         <p:spPr>
           <a:xfrm>
             <a:off x="9980640" y="7702560"/>
-            <a:ext cx="23927760" cy="19091160"/>
+            <a:ext cx="23927400" cy="19090800"/>
           </a:xfrm>
           <a:prstGeom prst="rect">
             <a:avLst/>
@@ -17153,7 +17153,7 @@
         <p:spPr>
           <a:xfrm>
             <a:off x="9980640" y="7702560"/>
-            <a:ext cx="23927760" cy="19091160"/>
+            <a:ext cx="23927400" cy="19090800"/>
           </a:xfrm>
           <a:prstGeom prst="rect">
             <a:avLst/>
@@ -17194,7 +17194,7 @@
         <p:spPr>
           <a:xfrm>
             <a:off x="2194560" y="1313280"/>
-            <a:ext cx="39499920" cy="25480080"/>
+            <a:ext cx="39499560" cy="25479720"/>
           </a:xfrm>
           <a:prstGeom prst="rect">
             <a:avLst/>
@@ -17236,7 +17236,7 @@
         <p:spPr>
           <a:xfrm>
             <a:off x="2194560" y="1313280"/>
-            <a:ext cx="39499920" cy="5495400"/>
+            <a:ext cx="39499560" cy="5495040"/>
           </a:xfrm>
           <a:prstGeom prst="rect">
             <a:avLst/>
@@ -17256,7 +17256,7 @@
         <p:spPr>
           <a:xfrm>
             <a:off x="2194560" y="7702560"/>
-            <a:ext cx="19274760" cy="9105120"/>
+            <a:ext cx="19274400" cy="9104760"/>
           </a:xfrm>
           <a:prstGeom prst="rect">
             <a:avLst/>
@@ -17276,7 +17276,7 @@
         <p:spPr>
           <a:xfrm>
             <a:off x="2194560" y="17674920"/>
-            <a:ext cx="19274760" cy="9105120"/>
+            <a:ext cx="19274400" cy="9104760"/>
           </a:xfrm>
           <a:prstGeom prst="rect">
             <a:avLst/>
@@ -17296,7 +17296,7 @@
         <p:spPr>
           <a:xfrm>
             <a:off x="22435200" y="7702560"/>
-            <a:ext cx="19274760" cy="19090440"/>
+            <a:ext cx="19274400" cy="19090080"/>
           </a:xfrm>
           <a:prstGeom prst="rect">
             <a:avLst/>
@@ -17338,7 +17338,7 @@
         <p:spPr>
           <a:xfrm>
             <a:off x="2194560" y="1313280"/>
-            <a:ext cx="39499920" cy="5495400"/>
+            <a:ext cx="39499560" cy="5495040"/>
           </a:xfrm>
           <a:prstGeom prst="rect">
             <a:avLst/>
@@ -17358,7 +17358,7 @@
         <p:spPr>
           <a:xfrm>
             <a:off x="2194560" y="7702560"/>
-            <a:ext cx="19274760" cy="19090440"/>
+            <a:ext cx="19274400" cy="19090080"/>
           </a:xfrm>
           <a:prstGeom prst="rect">
             <a:avLst/>
@@ -17378,7 +17378,7 @@
         <p:spPr>
           <a:xfrm>
             <a:off x="22435200" y="7702560"/>
-            <a:ext cx="19274760" cy="9105120"/>
+            <a:ext cx="19274400" cy="9104760"/>
           </a:xfrm>
           <a:prstGeom prst="rect">
             <a:avLst/>
@@ -17398,7 +17398,7 @@
         <p:spPr>
           <a:xfrm>
             <a:off x="22435200" y="17674920"/>
-            <a:ext cx="19274760" cy="9105120"/>
+            <a:ext cx="19274400" cy="9104760"/>
           </a:xfrm>
           <a:prstGeom prst="rect">
             <a:avLst/>
@@ -17440,7 +17440,7 @@
         <p:spPr>
           <a:xfrm>
             <a:off x="2194560" y="1313280"/>
-            <a:ext cx="39499920" cy="5495400"/>
+            <a:ext cx="39499560" cy="5495040"/>
           </a:xfrm>
           <a:prstGeom prst="rect">
             <a:avLst/>
@@ -17460,7 +17460,7 @@
         <p:spPr>
           <a:xfrm>
             <a:off x="2194560" y="7702560"/>
-            <a:ext cx="19274760" cy="9105120"/>
+            <a:ext cx="19274400" cy="9104760"/>
           </a:xfrm>
           <a:prstGeom prst="rect">
             <a:avLst/>
@@ -17480,7 +17480,7 @@
         <p:spPr>
           <a:xfrm>
             <a:off x="22435200" y="7702560"/>
-            <a:ext cx="19274760" cy="9105120"/>
+            <a:ext cx="19274400" cy="9104760"/>
           </a:xfrm>
           <a:prstGeom prst="rect">
             <a:avLst/>
@@ -17500,7 +17500,7 @@
         <p:spPr>
           <a:xfrm>
             <a:off x="2194560" y="17674920"/>
-            <a:ext cx="39499920" cy="9105120"/>
+            <a:ext cx="39499560" cy="9104760"/>
           </a:xfrm>
           <a:prstGeom prst="rect">
             <a:avLst/>
@@ -17542,7 +17542,7 @@
         <p:spPr>
           <a:xfrm>
             <a:off x="2194560" y="1313280"/>
-            <a:ext cx="39499920" cy="5495400"/>
+            <a:ext cx="39499560" cy="5495040"/>
           </a:xfrm>
           <a:prstGeom prst="rect">
             <a:avLst/>
@@ -17562,7 +17562,7 @@
         <p:spPr>
           <a:xfrm>
             <a:off x="2194560" y="7702560"/>
-            <a:ext cx="39499920" cy="9105120"/>
+            <a:ext cx="39499560" cy="9104760"/>
           </a:xfrm>
           <a:prstGeom prst="rect">
             <a:avLst/>
@@ -17582,7 +17582,7 @@
         <p:spPr>
           <a:xfrm>
             <a:off x="2194560" y="17674920"/>
-            <a:ext cx="39499920" cy="9105120"/>
+            <a:ext cx="39499560" cy="9104760"/>
           </a:xfrm>
           <a:prstGeom prst="rect">
             <a:avLst/>
@@ -17624,7 +17624,7 @@
         <p:spPr>
           <a:xfrm>
             <a:off x="2194560" y="1313280"/>
-            <a:ext cx="39499920" cy="5495400"/>
+            <a:ext cx="39499560" cy="5495040"/>
           </a:xfrm>
           <a:prstGeom prst="rect">
             <a:avLst/>
@@ -17644,7 +17644,7 @@
         <p:spPr>
           <a:xfrm>
             <a:off x="2194560" y="7702560"/>
-            <a:ext cx="19274760" cy="9105120"/>
+            <a:ext cx="19274400" cy="9104760"/>
           </a:xfrm>
           <a:prstGeom prst="rect">
             <a:avLst/>
@@ -17664,7 +17664,7 @@
         <p:spPr>
           <a:xfrm>
             <a:off x="22435200" y="7702560"/>
-            <a:ext cx="19274760" cy="9105120"/>
+            <a:ext cx="19274400" cy="9104760"/>
           </a:xfrm>
           <a:prstGeom prst="rect">
             <a:avLst/>
@@ -17684,7 +17684,7 @@
         <p:spPr>
           <a:xfrm>
             <a:off x="22435200" y="17674920"/>
-            <a:ext cx="19274760" cy="9105120"/>
+            <a:ext cx="19274400" cy="9104760"/>
           </a:xfrm>
           <a:prstGeom prst="rect">
             <a:avLst/>
@@ -17704,7 +17704,7 @@
         <p:spPr>
           <a:xfrm>
             <a:off x="2194560" y="17674920"/>
-            <a:ext cx="19274760" cy="9105120"/>
+            <a:ext cx="19274400" cy="9104760"/>
           </a:xfrm>
           <a:prstGeom prst="rect">
             <a:avLst/>
@@ -17746,7 +17746,7 @@
         <p:spPr>
           <a:xfrm>
             <a:off x="2194560" y="1313280"/>
-            <a:ext cx="39499920" cy="5495400"/>
+            <a:ext cx="39499560" cy="5495040"/>
           </a:xfrm>
           <a:prstGeom prst="rect">
             <a:avLst/>
@@ -17766,7 +17766,7 @@
         <p:spPr>
           <a:xfrm>
             <a:off x="2194560" y="7702560"/>
-            <a:ext cx="39499920" cy="19090440"/>
+            <a:ext cx="39499560" cy="19090080"/>
           </a:xfrm>
           <a:prstGeom prst="rect">
             <a:avLst/>
@@ -17786,7 +17786,7 @@
         <p:spPr>
           <a:xfrm>
             <a:off x="2194560" y="7702560"/>
-            <a:ext cx="39499920" cy="19090440"/>
+            <a:ext cx="39499560" cy="19090080"/>
           </a:xfrm>
           <a:prstGeom prst="rect">
             <a:avLst/>
@@ -17812,7 +17812,7 @@
         <p:spPr>
           <a:xfrm>
             <a:off x="9980640" y="7702560"/>
-            <a:ext cx="23927040" cy="19090440"/>
+            <a:ext cx="23926680" cy="19090080"/>
           </a:xfrm>
           <a:prstGeom prst="rect">
             <a:avLst/>
@@ -17837,7 +17837,7 @@
         <p:spPr>
           <a:xfrm>
             <a:off x="9980640" y="7702560"/>
-            <a:ext cx="23927040" cy="19090440"/>
+            <a:ext cx="23926680" cy="19090080"/>
           </a:xfrm>
           <a:prstGeom prst="rect">
             <a:avLst/>
@@ -17878,7 +17878,7 @@
         <p:spPr>
           <a:xfrm>
             <a:off x="2194560" y="1313280"/>
-            <a:ext cx="39500640" cy="5496120"/>
+            <a:ext cx="39500280" cy="5495760"/>
           </a:xfrm>
           <a:prstGeom prst="rect">
             <a:avLst/>
@@ -17898,7 +17898,7 @@
         <p:spPr>
           <a:xfrm>
             <a:off x="2194560" y="7702560"/>
-            <a:ext cx="19275480" cy="9105840"/>
+            <a:ext cx="19275120" cy="9105480"/>
           </a:xfrm>
           <a:prstGeom prst="rect">
             <a:avLst/>
@@ -17918,7 +17918,7 @@
         <p:spPr>
           <a:xfrm>
             <a:off x="22435200" y="7702560"/>
-            <a:ext cx="19275480" cy="9105840"/>
+            <a:ext cx="19275120" cy="9105480"/>
           </a:xfrm>
           <a:prstGeom prst="rect">
             <a:avLst/>
@@ -17938,7 +17938,7 @@
         <p:spPr>
           <a:xfrm>
             <a:off x="22435200" y="17674920"/>
-            <a:ext cx="19275480" cy="9105840"/>
+            <a:ext cx="19275120" cy="9105480"/>
           </a:xfrm>
           <a:prstGeom prst="rect">
             <a:avLst/>
@@ -17958,7 +17958,7 @@
         <p:spPr>
           <a:xfrm>
             <a:off x="2194560" y="17674920"/>
-            <a:ext cx="19275480" cy="9105840"/>
+            <a:ext cx="19275120" cy="9105480"/>
           </a:xfrm>
           <a:prstGeom prst="rect">
             <a:avLst/>

</xml_diff>

<commit_message>
Started working on section 3 (Related Works), and worked on pictures to add.
</commit_message>
<xml_diff>
--- a/CF_Poster.pptx
+++ b/CF_Poster.pptx
@@ -27,6 +27,13 @@
     <p:sldId id="263" r:id="rId20"/>
     <p:sldId id="264" r:id="rId21"/>
     <p:sldId id="265" r:id="rId22"/>
+    <p:sldId id="266" r:id="rId23"/>
+    <p:sldId id="267" r:id="rId24"/>
+    <p:sldId id="268" r:id="rId25"/>
+    <p:sldId id="269" r:id="rId26"/>
+    <p:sldId id="270" r:id="rId27"/>
+    <p:sldId id="271" r:id="rId28"/>
+    <p:sldId id="272" r:id="rId29"/>
   </p:sldIdLst>
   <p:sldSz cx="43891200" cy="32918400"/>
   <p:notesSz cx="7315200" cy="9601200"/>
@@ -202,7 +209,7 @@
           <a:bodyPr lIns="0" rIns="0" tIns="0" bIns="0" anchor="b"/>
           <a:p>
             <a:pPr algn="r"/>
-            <a:fld id="{5196FF0D-7EFD-40DB-AD1C-07E4E18EED89}" type="slidenum">
+            <a:fld id="{91286936-9CB5-4407-AAC2-E07092AB93D7}" type="slidenum">
               <a:rPr lang="en-US" sz="1400">
                 <a:latin typeface="Times New Roman"/>
               </a:rPr>
@@ -237,14 +244,14 @@
       </p:grpSpPr>
       <p:sp>
         <p:nvSpPr>
-          <p:cNvPr id="452" name="CustomShape 1"/>
+          <p:cNvPr id="472" name="CustomShape 1"/>
           <p:cNvSpPr/>
           <p:nvPr/>
         </p:nvSpPr>
         <p:spPr>
           <a:xfrm>
             <a:off x="4143600" y="9119520"/>
-            <a:ext cx="3167280" cy="477360"/>
+            <a:ext cx="3166920" cy="477000"/>
           </a:xfrm>
           <a:prstGeom prst="rect">
             <a:avLst/>
@@ -262,7 +269,7 @@
                 <a:spcPct val="100000"/>
               </a:lnSpc>
             </a:pPr>
-            <a:fld id="{BF1EE4A6-75A0-4641-B5D0-29AF03C6A207}" type="slidenum">
+            <a:fld id="{8B1AAFA1-8911-44A6-B755-DCD1095FF337}" type="slidenum">
               <a:rPr lang="en-US" sz="1200">
                 <a:solidFill>
                   <a:srgbClr val="000000"/>
@@ -278,7 +285,7 @@
       </p:sp>
       <p:sp>
         <p:nvSpPr>
-          <p:cNvPr id="453" name="PlaceHolder 2"/>
+          <p:cNvPr id="473" name="PlaceHolder 2"/>
           <p:cNvSpPr>
             <a:spLocks noGrp="1"/>
           </p:cNvSpPr>
@@ -289,7 +296,7 @@
         <p:spPr>
           <a:xfrm>
             <a:off x="731520" y="4561560"/>
-            <a:ext cx="5849640" cy="4317840"/>
+            <a:ext cx="5849280" cy="4317480"/>
           </a:xfrm>
           <a:prstGeom prst="rect">
             <a:avLst/>
@@ -12124,7 +12131,7 @@
         <p:spPr>
           <a:xfrm>
             <a:off x="9980640" y="7702560"/>
-            <a:ext cx="23926680" cy="19090080"/>
+            <a:ext cx="23926320" cy="19089720"/>
           </a:xfrm>
           <a:prstGeom prst="rect">
             <a:avLst/>
@@ -12149,7 +12156,7 @@
         <p:spPr>
           <a:xfrm>
             <a:off x="9980640" y="7702560"/>
-            <a:ext cx="23926680" cy="19090080"/>
+            <a:ext cx="23926320" cy="19089720"/>
           </a:xfrm>
           <a:prstGeom prst="rect">
             <a:avLst/>
@@ -12174,7 +12181,7 @@
         <p:spPr>
           <a:xfrm>
             <a:off x="9980640" y="7702560"/>
-            <a:ext cx="23927400" cy="19090800"/>
+            <a:ext cx="23927040" cy="19090440"/>
           </a:xfrm>
           <a:prstGeom prst="rect">
             <a:avLst/>
@@ -12199,7 +12206,7 @@
         <p:spPr>
           <a:xfrm>
             <a:off x="9980640" y="7702560"/>
-            <a:ext cx="23927400" cy="19090800"/>
+            <a:ext cx="23927040" cy="19090440"/>
           </a:xfrm>
           <a:prstGeom prst="rect">
             <a:avLst/>
@@ -14333,7 +14340,7 @@
         <p:spPr>
           <a:xfrm>
             <a:off x="9980640" y="7702560"/>
-            <a:ext cx="23926680" cy="19090080"/>
+            <a:ext cx="23926320" cy="19089720"/>
           </a:xfrm>
           <a:prstGeom prst="rect">
             <a:avLst/>
@@ -14358,7 +14365,7 @@
         <p:spPr>
           <a:xfrm>
             <a:off x="9980640" y="7702560"/>
-            <a:ext cx="23926680" cy="19090080"/>
+            <a:ext cx="23926320" cy="19089720"/>
           </a:xfrm>
           <a:prstGeom prst="rect">
             <a:avLst/>
@@ -14581,7 +14588,7 @@
         <p:spPr>
           <a:xfrm>
             <a:off x="9980640" y="7702560"/>
-            <a:ext cx="23926680" cy="19090080"/>
+            <a:ext cx="23926320" cy="19089720"/>
           </a:xfrm>
           <a:prstGeom prst="rect">
             <a:avLst/>
@@ -14606,7 +14613,7 @@
         <p:spPr>
           <a:xfrm>
             <a:off x="9980640" y="7702560"/>
-            <a:ext cx="23926680" cy="19090080"/>
+            <a:ext cx="23926320" cy="19089720"/>
           </a:xfrm>
           <a:prstGeom prst="rect">
             <a:avLst/>
@@ -15178,7 +15185,7 @@
         <p:spPr>
           <a:xfrm>
             <a:off x="32058720" y="20970360"/>
-            <a:ext cx="11829960" cy="11945520"/>
+            <a:ext cx="11829600" cy="11945160"/>
           </a:xfrm>
           <a:prstGeom prst="rect">
             <a:avLst/>
@@ -15200,7 +15207,7 @@
         <p:spPr>
           <a:xfrm>
             <a:off x="32058720" y="5105520"/>
-            <a:ext cx="11829960" cy="15999480"/>
+            <a:ext cx="11829600" cy="15999120"/>
           </a:xfrm>
           <a:prstGeom prst="rect">
             <a:avLst/>
@@ -15222,7 +15229,7 @@
         <p:spPr>
           <a:xfrm>
             <a:off x="12268080" y="5105520"/>
-            <a:ext cx="19584000" cy="27810360"/>
+            <a:ext cx="19583640" cy="27810000"/>
           </a:xfrm>
           <a:prstGeom prst="rect">
             <a:avLst/>
@@ -15241,8 +15248,8 @@
         </p:nvSpPr>
         <p:spPr>
           <a:xfrm>
-            <a:off x="0" y="5105520"/>
-            <a:ext cx="12076200" cy="27810360"/>
+            <a:off x="0" y="5108400"/>
+            <a:ext cx="12075840" cy="27810000"/>
           </a:xfrm>
           <a:prstGeom prst="rect">
             <a:avLst/>
@@ -15264,7 +15271,7 @@
         <p:spPr>
           <a:xfrm>
             <a:off x="0" y="0"/>
-            <a:ext cx="43877520" cy="3156480"/>
+            <a:ext cx="43877160" cy="3156120"/>
           </a:xfrm>
           <a:prstGeom prst="rect">
             <a:avLst/>
@@ -15305,7 +15312,7 @@
         <p:spPr>
           <a:xfrm>
             <a:off x="0" y="5105520"/>
-            <a:ext cx="12076200" cy="1003320"/>
+            <a:ext cx="12075840" cy="1002960"/>
           </a:xfrm>
           <a:prstGeom prst="rect">
             <a:avLst/>
@@ -15348,7 +15355,7 @@
         <p:spPr>
           <a:xfrm>
             <a:off x="32058720" y="21793320"/>
-            <a:ext cx="11829960" cy="1003320"/>
+            <a:ext cx="11829600" cy="1002960"/>
           </a:xfrm>
           <a:prstGeom prst="rect">
             <a:avLst/>
@@ -15391,7 +15398,7 @@
         <p:spPr>
           <a:xfrm>
             <a:off x="11160" y="3124080"/>
-            <a:ext cx="43877520" cy="1791360"/>
+            <a:ext cx="43877160" cy="1791000"/>
           </a:xfrm>
           <a:prstGeom prst="rect">
             <a:avLst/>
@@ -15579,8 +15586,8 @@
         </p:nvSpPr>
         <p:spPr>
           <a:xfrm>
-            <a:off x="-43200" y="10013040"/>
-            <a:ext cx="12076200" cy="1003320"/>
+            <a:off x="0" y="11250000"/>
+            <a:ext cx="12075840" cy="1002960"/>
           </a:xfrm>
           <a:prstGeom prst="rect">
             <a:avLst/>
@@ -15623,7 +15630,7 @@
         <p:spPr>
           <a:xfrm>
             <a:off x="5092200" y="10103040"/>
-            <a:ext cx="182520" cy="311400"/>
+            <a:ext cx="182160" cy="311040"/>
           </a:xfrm>
           <a:prstGeom prst="rect">
             <a:avLst/>
@@ -15643,7 +15650,7 @@
         <p:spPr>
           <a:xfrm>
             <a:off x="5290200" y="10023120"/>
-            <a:ext cx="180360" cy="311400"/>
+            <a:ext cx="180000" cy="311040"/>
           </a:xfrm>
           <a:prstGeom prst="rect">
             <a:avLst/>
@@ -15663,7 +15670,7 @@
         <p:spPr>
           <a:xfrm>
             <a:off x="77040" y="13716000"/>
-            <a:ext cx="11142000" cy="2070360"/>
+            <a:ext cx="11141640" cy="2070000"/>
           </a:xfrm>
           <a:prstGeom prst="rect">
             <a:avLst/>
@@ -15682,51 +15689,8 @@
         </p:nvSpPr>
         <p:spPr>
           <a:xfrm>
-            <a:off x="0" y="23743800"/>
-            <a:ext cx="12076560" cy="1003320"/>
-          </a:xfrm>
-          <a:prstGeom prst="rect">
-            <a:avLst/>
-          </a:prstGeom>
-          <a:solidFill>
-            <a:srgbClr val="c6d9f1"/>
-          </a:solidFill>
-          <a:ln>
-            <a:noFill/>
-          </a:ln>
-        </p:spPr>
-        <p:txBody>
-          <a:bodyPr lIns="90000" rIns="90000" tIns="45000" bIns="45000" anchor="ctr"/>
-          <a:p>
-            <a:pPr algn="ctr">
-              <a:lnSpc>
-                <a:spcPct val="100000"/>
-              </a:lnSpc>
-            </a:pPr>
-            <a:r>
-              <a:rPr b="1" lang="en-US" sz="4000">
-                <a:solidFill>
-                  <a:srgbClr val="000000"/>
-                </a:solidFill>
-                <a:latin typeface="Century Gothic"/>
-                <a:ea typeface="Arial"/>
-              </a:rPr>
-              <a:t>Our Solution: HybridSwap</a:t>
-            </a:r>
-            <a:endParaRPr/>
-          </a:p>
-        </p:txBody>
-      </p:sp>
-      <p:sp>
-        <p:nvSpPr>
-          <p:cNvPr id="395" name="CustomShape 14"/>
-          <p:cNvSpPr/>
-          <p:nvPr/>
-        </p:nvSpPr>
-        <p:spPr>
-          <a:xfrm>
             <a:off x="12192120" y="6190560"/>
-            <a:ext cx="19649160" cy="14380920"/>
+            <a:ext cx="19648800" cy="14380560"/>
           </a:xfrm>
           <a:prstGeom prst="rect">
             <a:avLst/>
@@ -15739,14 +15703,14 @@
       </p:sp>
       <p:sp>
         <p:nvSpPr>
-          <p:cNvPr id="396" name="CustomShape 15"/>
+          <p:cNvPr id="395" name="CustomShape 14"/>
           <p:cNvSpPr/>
           <p:nvPr/>
         </p:nvSpPr>
         <p:spPr>
           <a:xfrm>
             <a:off x="12482280" y="27419400"/>
-            <a:ext cx="19657080" cy="1003320"/>
+            <a:ext cx="19656720" cy="1002960"/>
           </a:xfrm>
           <a:prstGeom prst="rect">
             <a:avLst/>
@@ -15790,14 +15754,14 @@
       </p:sp>
       <p:sp>
         <p:nvSpPr>
-          <p:cNvPr id="397" name="CustomShape 16"/>
+          <p:cNvPr id="396" name="CustomShape 15"/>
           <p:cNvSpPr/>
           <p:nvPr/>
         </p:nvSpPr>
         <p:spPr>
           <a:xfrm>
             <a:off x="32004000" y="6019920"/>
-            <a:ext cx="11879280" cy="2216520"/>
+            <a:ext cx="11878920" cy="2216160"/>
           </a:xfrm>
           <a:prstGeom prst="rect">
             <a:avLst/>
@@ -15855,14 +15819,14 @@
       </p:sp>
       <p:sp>
         <p:nvSpPr>
-          <p:cNvPr id="398" name="CustomShape 17"/>
+          <p:cNvPr id="397" name="CustomShape 16"/>
           <p:cNvSpPr/>
           <p:nvPr/>
         </p:nvSpPr>
         <p:spPr>
           <a:xfrm>
             <a:off x="32060880" y="13898880"/>
-            <a:ext cx="11829960" cy="1003320"/>
+            <a:ext cx="11829600" cy="1002960"/>
           </a:xfrm>
           <a:prstGeom prst="rect">
             <a:avLst/>
@@ -15898,14 +15862,14 @@
       </p:sp>
       <p:sp>
         <p:nvSpPr>
-          <p:cNvPr id="399" name="CustomShape 18"/>
+          <p:cNvPr id="398" name="CustomShape 17"/>
           <p:cNvSpPr/>
           <p:nvPr/>
         </p:nvSpPr>
         <p:spPr>
           <a:xfrm>
             <a:off x="0" y="17891640"/>
-            <a:ext cx="12076200" cy="1003320"/>
+            <a:ext cx="12075840" cy="1002960"/>
           </a:xfrm>
           <a:prstGeom prst="rect">
             <a:avLst/>
@@ -15933,22 +15897,22 @@
                 <a:latin typeface="Century Gothic"/>
                 <a:ea typeface="Arial"/>
               </a:rPr>
-              <a:t>Existing Solution</a:t>
-            </a:r>
-            <a:endParaRPr/>
-          </a:p>
-        </p:txBody>
-      </p:sp>
-      <p:sp>
-        <p:nvSpPr>
-          <p:cNvPr id="400" name="CustomShape 19"/>
+              <a:t>Existing Solutions</a:t>
+            </a:r>
+            <a:endParaRPr/>
+          </a:p>
+        </p:txBody>
+      </p:sp>
+      <p:sp>
+        <p:nvSpPr>
+          <p:cNvPr id="399" name="CustomShape 18"/>
           <p:cNvSpPr/>
           <p:nvPr/>
         </p:nvSpPr>
         <p:spPr>
           <a:xfrm>
             <a:off x="32058720" y="5105520"/>
-            <a:ext cx="11829960" cy="1003320"/>
+            <a:ext cx="11829600" cy="1002960"/>
           </a:xfrm>
           <a:prstGeom prst="rect">
             <a:avLst/>
@@ -15984,7 +15948,7 @@
       </p:sp>
       <p:pic>
         <p:nvPicPr>
-          <p:cNvPr id="401" name="Picture 726" descr=""/>
+          <p:cNvPr id="400" name="Picture 726" descr=""/>
           <p:cNvPicPr/>
           <p:nvPr/>
         </p:nvPicPr>
@@ -15997,7 +15961,7 @@
         <p:spPr>
           <a:xfrm>
             <a:off x="36717120" y="3218040"/>
-            <a:ext cx="6409440" cy="1656360"/>
+            <a:ext cx="6409080" cy="1656000"/>
           </a:xfrm>
           <a:prstGeom prst="rect">
             <a:avLst/>
@@ -16009,14 +15973,14 @@
       </p:pic>
       <p:sp>
         <p:nvSpPr>
-          <p:cNvPr id="402" name="CustomShape 20"/>
+          <p:cNvPr id="401" name="CustomShape 19"/>
           <p:cNvSpPr/>
           <p:nvPr/>
         </p:nvSpPr>
         <p:spPr>
           <a:xfrm>
-            <a:off x="548640" y="11163240"/>
-            <a:ext cx="11153880" cy="3099600"/>
+            <a:off x="548640" y="12618720"/>
+            <a:ext cx="11153520" cy="3099240"/>
           </a:xfrm>
           <a:prstGeom prst="rect">
             <a:avLst/>
@@ -16038,7 +16002,7 @@
               <a:buChar char="l"/>
             </a:pPr>
             <a:r>
-              <a:rPr lang="en-US" sz="3200">
+              <a:rPr b="1" lang="en-US" sz="3200">
                 <a:solidFill>
                   <a:srgbClr val="000000"/>
                 </a:solidFill>
@@ -16048,7 +16012,7 @@
               <a:t> </a:t>
             </a:r>
             <a:r>
-              <a:rPr lang="en-US" sz="3200">
+              <a:rPr b="1" lang="en-US" sz="3200">
                 <a:solidFill>
                   <a:srgbClr val="000000"/>
                 </a:solidFill>
@@ -16076,7 +16040,7 @@
                 <a:latin typeface="Century Gothic"/>
                 <a:ea typeface="Arial"/>
               </a:rPr>
-              <a:t>Incorporating SSD into VMM can  increase the bandwidth of the swapping system.</a:t>
+              <a:t>Incorporating SSD into Virtual Memory Management can  increase the bandwidth of the swapping system.</a:t>
             </a:r>
             <a:endParaRPr/>
           </a:p>
@@ -16090,7 +16054,7 @@
               <a:buChar char="l"/>
             </a:pPr>
             <a:r>
-              <a:rPr lang="en-US" sz="3200">
+              <a:rPr b="1" lang="en-US" sz="3200">
                 <a:solidFill>
                   <a:srgbClr val="000000"/>
                 </a:solidFill>
@@ -16100,7 +16064,7 @@
               <a:t> </a:t>
             </a:r>
             <a:r>
-              <a:rPr lang="en-US" sz="3200">
+              <a:rPr b="1" lang="en-US" sz="3200">
                 <a:solidFill>
                   <a:srgbClr val="000000"/>
                 </a:solidFill>
@@ -16136,14 +16100,14 @@
       </p:sp>
       <p:sp>
         <p:nvSpPr>
-          <p:cNvPr id="403" name="CustomShape 21"/>
+          <p:cNvPr id="402" name="CustomShape 20"/>
           <p:cNvSpPr/>
           <p:nvPr/>
         </p:nvSpPr>
         <p:spPr>
           <a:xfrm>
             <a:off x="32532480" y="15303960"/>
-            <a:ext cx="9895320" cy="6489000"/>
+            <a:ext cx="9894960" cy="6488640"/>
           </a:xfrm>
           <a:prstGeom prst="rect">
             <a:avLst/>
@@ -16235,14 +16199,14 @@
       </p:sp>
       <p:sp>
         <p:nvSpPr>
-          <p:cNvPr id="404" name="CustomShape 22"/>
+          <p:cNvPr id="403" name="CustomShape 21"/>
           <p:cNvSpPr/>
           <p:nvPr/>
         </p:nvSpPr>
         <p:spPr>
           <a:xfrm>
             <a:off x="457200" y="6111000"/>
-            <a:ext cx="11245320" cy="3250800"/>
+            <a:ext cx="11244960" cy="4861800"/>
           </a:xfrm>
           <a:prstGeom prst="rect">
             <a:avLst/>
@@ -16319,21 +16283,61 @@
               <a:lnSpc>
                 <a:spcPct val="100000"/>
               </a:lnSpc>
+              <a:buFont typeface="Wingdings" charset="2"/>
+              <a:buChar char=""/>
             </a:pPr>
-            <a:endParaRPr/>
-          </a:p>
-        </p:txBody>
-      </p:sp>
-      <p:sp>
-        <p:nvSpPr>
-          <p:cNvPr id="405" name="CustomShape 23"/>
+            <a:r>
+              <a:rPr lang="en-US" sz="3200">
+                <a:solidFill>
+                  <a:srgbClr val="dd4814"/>
+                </a:solidFill>
+                <a:latin typeface="Century Gothic"/>
+                <a:ea typeface="Arial"/>
+              </a:rPr>
+              <a:t>TODO: Find example </a:t>
+            </a:r>
+            <a:r>
+              <a:rPr b="1" lang="en-US" sz="3200">
+                <a:solidFill>
+                  <a:srgbClr val="dd4814"/>
+                </a:solidFill>
+                <a:latin typeface="Century Gothic"/>
+                <a:ea typeface="Arial"/>
+              </a:rPr>
+              <a:t>picture</a:t>
+            </a:r>
+            <a:r>
+              <a:rPr lang="en-US" sz="3200">
+                <a:solidFill>
+                  <a:srgbClr val="dd4814"/>
+                </a:solidFill>
+                <a:latin typeface="Century Gothic"/>
+                <a:ea typeface="Arial"/>
+              </a:rPr>
+              <a:t> of SSD vs. HDD.</a:t>
+            </a:r>
+            <a:endParaRPr/>
+          </a:p>
+          <a:p>
+            <a:pPr>
+              <a:lnSpc>
+                <a:spcPct val="100000"/>
+              </a:lnSpc>
+            </a:pPr>
+            <a:endParaRPr/>
+          </a:p>
+        </p:txBody>
+      </p:sp>
+      <p:sp>
+        <p:nvSpPr>
+          <p:cNvPr id="404" name="CustomShape 22"/>
           <p:cNvSpPr/>
           <p:nvPr/>
         </p:nvSpPr>
         <p:spPr>
           <a:xfrm>
-            <a:off x="518400" y="19058400"/>
-            <a:ext cx="11184120" cy="3250800"/>
+            <a:off x="548640" y="19152360"/>
+            <a:ext cx="11183760" cy="3250440"/>
           </a:xfrm>
           <a:prstGeom prst="rect">
             <a:avLst/>
@@ -16361,7 +16365,47 @@
                 <a:latin typeface="Century Gothic"/>
                 <a:ea typeface="Arial"/>
               </a:rPr>
-              <a:t>SSD is used for speeding up disk access.</a:t>
+              <a:t>SSD has been used for enhancing the speed of hard disk either by being a buffer cache between DRAM and hard disk </a:t>
+            </a:r>
+            <a:r>
+              <a:rPr lang="en-US" sz="3200">
+                <a:solidFill>
+                  <a:srgbClr val="dd4814"/>
+                </a:solidFill>
+                <a:latin typeface="Century Gothic"/>
+                <a:ea typeface="Arial"/>
+              </a:rPr>
+              <a:t>[26], [22]</a:t>
+            </a:r>
+            <a:r>
+              <a:rPr lang="en-US" sz="3200">
+                <a:solidFill>
+                  <a:srgbClr val="000000"/>
+                </a:solidFill>
+                <a:latin typeface="Century Gothic"/>
+                <a:ea typeface="Arial"/>
+              </a:rPr>
+              <a:t>, or by being used in parallel with hard disk </a:t>
+            </a:r>
+            <a:r>
+              <a:rPr lang="en-US" sz="3200">
+                <a:solidFill>
+                  <a:srgbClr val="dd4814"/>
+                </a:solidFill>
+                <a:latin typeface="Century Gothic"/>
+                <a:ea typeface="Arial"/>
+              </a:rPr>
+              <a:t>[6], [21],[29]</a:t>
+            </a:r>
+            <a:r>
+              <a:rPr lang="en-US" sz="3200">
+                <a:solidFill>
+                  <a:srgbClr val="000000"/>
+                </a:solidFill>
+                <a:latin typeface="Century Gothic"/>
+                <a:ea typeface="Arial"/>
+              </a:rPr>
+              <a:t>.</a:t>
             </a:r>
             <a:endParaRPr/>
           </a:p>
@@ -16373,59 +16417,8 @@
               <a:buFont typeface="Wingdings" charset="2"/>
               <a:buChar char=""/>
             </a:pPr>
-            <a:r>
-              <a:rPr lang="en-US" sz="3200">
-                <a:solidFill>
-                  <a:srgbClr val="000000"/>
-                </a:solidFill>
-                <a:latin typeface="Century Gothic"/>
-                <a:ea typeface="Arial"/>
-              </a:rPr>
-              <a:t>When used alone, SSD provides extremely </a:t>
-            </a:r>
-            <a:r>
-              <a:rPr lang="en-US" sz="3200" u="sng">
-                <a:solidFill>
-                  <a:srgbClr val="000000"/>
-                </a:solidFill>
-                <a:latin typeface="Century Gothic"/>
-                <a:ea typeface="Arial"/>
-              </a:rPr>
-              <a:t>“fast storage systems.”</a:t>
-            </a:r>
-            <a:endParaRPr/>
-          </a:p>
-          <a:p>
-            <a:pPr>
-              <a:lnSpc>
-                <a:spcPct val="100000"/>
-              </a:lnSpc>
-            </a:pPr>
-            <a:endParaRPr/>
-          </a:p>
-        </p:txBody>
-      </p:sp>
-      <p:sp>
-        <p:nvSpPr>
-          <p:cNvPr id="406" name="CustomShape 24"/>
-          <p:cNvSpPr/>
-          <p:nvPr/>
-        </p:nvSpPr>
-        <p:spPr>
-          <a:xfrm>
-            <a:off x="792720" y="25146000"/>
-            <a:ext cx="10909800" cy="3250800"/>
-          </a:xfrm>
-          <a:prstGeom prst="rect">
-            <a:avLst/>
-          </a:prstGeom>
-          <a:noFill/>
-          <a:ln w="19080">
-            <a:noFill/>
-          </a:ln>
-        </p:spPr>
-        <p:txBody>
-          <a:bodyPr lIns="90000" rIns="90000" tIns="45000" bIns="45000"/>
+            <a:endParaRPr/>
+          </a:p>
           <a:p>
             <a:pPr>
               <a:lnSpc>
@@ -16442,10 +16435,53 @@
                 <a:latin typeface="Century Gothic"/>
                 <a:ea typeface="Arial"/>
               </a:rPr>
-              <a:t>Disk manages sequential reads and SSD manages random reads.</a:t>
-            </a:r>
-            <a:endParaRPr/>
-          </a:p>
+              <a:t>Hard disk has also been used intentionally for reducing SSD writes </a:t>
+            </a:r>
+            <a:r>
+              <a:rPr lang="en-US" sz="3200">
+                <a:solidFill>
+                  <a:srgbClr val="dd4814"/>
+                </a:solidFill>
+                <a:latin typeface="Century Gothic"/>
+                <a:ea typeface="Arial"/>
+              </a:rPr>
+              <a:t>[9], [23]</a:t>
+            </a:r>
+            <a:r>
+              <a:rPr lang="en-US" sz="3200">
+                <a:solidFill>
+                  <a:srgbClr val="000000"/>
+                </a:solidFill>
+                <a:latin typeface="Century Gothic"/>
+                <a:ea typeface="Arial"/>
+              </a:rPr>
+              <a:t>.</a:t>
+            </a:r>
+            <a:endParaRPr/>
+          </a:p>
+        </p:txBody>
+      </p:sp>
+      <p:sp>
+        <p:nvSpPr>
+          <p:cNvPr id="405" name="CustomShape 23"/>
+          <p:cNvSpPr/>
+          <p:nvPr/>
+        </p:nvSpPr>
+        <p:spPr>
+          <a:xfrm>
+            <a:off x="32552640" y="23225760"/>
+            <a:ext cx="10880280" cy="3250440"/>
+          </a:xfrm>
+          <a:prstGeom prst="rect">
+            <a:avLst/>
+          </a:prstGeom>
+          <a:noFill/>
+          <a:ln w="19080">
+            <a:noFill/>
+          </a:ln>
+        </p:spPr>
+        <p:txBody>
+          <a:bodyPr lIns="90000" rIns="90000" tIns="45000" bIns="45000"/>
           <a:p>
             <a:pPr>
               <a:lnSpc>
@@ -16462,10 +16498,55 @@
                 <a:latin typeface="Century Gothic"/>
                 <a:ea typeface="Arial"/>
               </a:rPr>
-              <a:t>SSD provides enhanced performance, while disk allows a longer lifetime for SSD, thus combining the advantages of both.</a:t>
-            </a:r>
-            <a:endParaRPr/>
-          </a:p>
+              <a:t>Spatial locality can be used in conjunction with temporal locality to determine the optimal means of swapping pages between SSD and disk.</a:t>
+            </a:r>
+            <a:endParaRPr/>
+          </a:p>
+        </p:txBody>
+      </p:sp>
+      <p:sp>
+        <p:nvSpPr>
+          <p:cNvPr id="406" name="CustomShape 24"/>
+          <p:cNvSpPr/>
+          <p:nvPr/>
+        </p:nvSpPr>
+        <p:spPr>
+          <a:xfrm>
+            <a:off x="12265200" y="5106600"/>
+            <a:ext cx="19474920" cy="27810000"/>
+          </a:xfrm>
+          <a:prstGeom prst="rect">
+            <a:avLst/>
+          </a:prstGeom>
+          <a:solidFill>
+            <a:srgbClr val="ffffff"/>
+          </a:solidFill>
+          <a:ln>
+            <a:noFill/>
+          </a:ln>
+        </p:spPr>
+      </p:sp>
+      <p:sp>
+        <p:nvSpPr>
+          <p:cNvPr id="407" name="CustomShape 25"/>
+          <p:cNvSpPr/>
+          <p:nvPr/>
+        </p:nvSpPr>
+        <p:spPr>
+          <a:xfrm>
+            <a:off x="12894840" y="18329400"/>
+            <a:ext cx="18103320" cy="3250440"/>
+          </a:xfrm>
+          <a:prstGeom prst="rect">
+            <a:avLst/>
+          </a:prstGeom>
+          <a:noFill/>
+          <a:ln w="19080">
+            <a:noFill/>
+          </a:ln>
+        </p:spPr>
+        <p:txBody>
+          <a:bodyPr lIns="90000" rIns="90000" tIns="45000" bIns="45000"/>
           <a:p>
             <a:pPr>
               <a:lnSpc>
@@ -16482,51 +16563,10 @@
                 <a:latin typeface="Century Gothic"/>
                 <a:ea typeface="Arial"/>
               </a:rPr>
-              <a:t>The three steps of swapping out pages according to HybridSwap are </a:t>
-            </a:r>
-            <a:r>
-              <a:rPr lang="en-US" sz="3200" u="sng">
-                <a:solidFill>
-                  <a:srgbClr val="000000"/>
-                </a:solidFill>
-                <a:latin typeface="Century Gothic"/>
-                <a:ea typeface="Arial"/>
-              </a:rPr>
-              <a:t>“selecting a candidate sequence, evaluating its spatial locality, and determining swapping destinations.”</a:t>
-            </a:r>
-            <a:endParaRPr/>
-          </a:p>
-          <a:p>
-            <a:pPr>
-              <a:lnSpc>
-                <a:spcPct val="100000"/>
-              </a:lnSpc>
-            </a:pPr>
-            <a:endParaRPr/>
-          </a:p>
-        </p:txBody>
-      </p:sp>
-      <p:sp>
-        <p:nvSpPr>
-          <p:cNvPr id="407" name="CustomShape 25"/>
-          <p:cNvSpPr/>
-          <p:nvPr/>
-        </p:nvSpPr>
-        <p:spPr>
-          <a:xfrm>
-            <a:off x="32552640" y="23225760"/>
-            <a:ext cx="10880640" cy="3250800"/>
-          </a:xfrm>
-          <a:prstGeom prst="rect">
-            <a:avLst/>
-          </a:prstGeom>
-          <a:noFill/>
-          <a:ln w="19080">
-            <a:noFill/>
-          </a:ln>
-        </p:spPr>
-        <p:txBody>
-          <a:bodyPr lIns="90000" rIns="90000" tIns="45000" bIns="45000"/>
+              <a:t>Pages with the least temporal locality are the most likely to be swapped out.</a:t>
+            </a:r>
+            <a:endParaRPr/>
+          </a:p>
           <a:p>
             <a:pPr>
               <a:lnSpc>
@@ -16543,55 +16583,10 @@
                 <a:latin typeface="Century Gothic"/>
                 <a:ea typeface="Arial"/>
               </a:rPr>
-              <a:t>Spatial locality can be used in conjunction with temporal locality to determine the optimal means of swapping pages between SSD and disk.</a:t>
-            </a:r>
-            <a:endParaRPr/>
-          </a:p>
-        </p:txBody>
-      </p:sp>
-      <p:sp>
-        <p:nvSpPr>
-          <p:cNvPr id="408" name="CustomShape 26"/>
-          <p:cNvSpPr/>
-          <p:nvPr/>
-        </p:nvSpPr>
-        <p:spPr>
-          <a:xfrm>
-            <a:off x="12265200" y="5106600"/>
-            <a:ext cx="19475280" cy="27810360"/>
-          </a:xfrm>
-          <a:prstGeom prst="rect">
-            <a:avLst/>
-          </a:prstGeom>
-          <a:solidFill>
-            <a:srgbClr val="ffffff"/>
-          </a:solidFill>
-          <a:ln>
-            <a:noFill/>
-          </a:ln>
-        </p:spPr>
-      </p:sp>
-      <p:sp>
-        <p:nvSpPr>
-          <p:cNvPr id="409" name="CustomShape 27"/>
-          <p:cNvSpPr/>
-          <p:nvPr/>
-        </p:nvSpPr>
-        <p:spPr>
-          <a:xfrm>
-            <a:off x="12893040" y="6583680"/>
-            <a:ext cx="18103680" cy="3250800"/>
-          </a:xfrm>
-          <a:prstGeom prst="rect">
-            <a:avLst/>
-          </a:prstGeom>
-          <a:noFill/>
-          <a:ln w="19080">
-            <a:noFill/>
-          </a:ln>
-        </p:spPr>
-        <p:txBody>
-          <a:bodyPr lIns="90000" rIns="90000" tIns="45000" bIns="45000"/>
+              <a:t>Spatial locality must also be used to make certain that swap-in latency and page-fault latency are not increased. </a:t>
+            </a:r>
+            <a:endParaRPr/>
+          </a:p>
           <a:p>
             <a:pPr>
               <a:lnSpc>
@@ -16608,7 +16603,7 @@
                 <a:latin typeface="Century Gothic"/>
                 <a:ea typeface="Arial"/>
               </a:rPr>
-              <a:t>Pages with the least temporal locality are the most likely to be swapped out.</a:t>
+              <a:t>Disk swap manages sequences with strong spatial locality and weak temporal locality, while SSD swap manages page sequences with weak spatial locality.</a:t>
             </a:r>
             <a:endParaRPr/>
           </a:p>
@@ -16628,10 +16623,182 @@
                 <a:latin typeface="Century Gothic"/>
                 <a:ea typeface="Arial"/>
               </a:rPr>
-              <a:t>Spatial locality must also be used to make certain that swap-in latency and page-fault latency are not increased. </a:t>
-            </a:r>
-            <a:endParaRPr/>
-          </a:p>
+              <a:t>A variant of the LRU replacement algorithm is used, </a:t>
+            </a:r>
+            <a:r>
+              <a:rPr lang="en-US" sz="3200" u="sng">
+                <a:solidFill>
+                  <a:srgbClr val="000000"/>
+                </a:solidFill>
+                <a:latin typeface="Century Gothic"/>
+                <a:ea typeface="Arial"/>
+              </a:rPr>
+              <a:t>“similar to the 2Q replacement”</a:t>
+            </a:r>
+            <a:r>
+              <a:rPr lang="en-US" sz="3200">
+                <a:solidFill>
+                  <a:srgbClr val="000000"/>
+                </a:solidFill>
+                <a:latin typeface="Century Gothic"/>
+                <a:ea typeface="Arial"/>
+              </a:rPr>
+              <a:t>.</a:t>
+            </a:r>
+            <a:endParaRPr/>
+          </a:p>
+        </p:txBody>
+      </p:sp>
+      <p:sp>
+        <p:nvSpPr>
+          <p:cNvPr id="408" name="CustomShape 26"/>
+          <p:cNvSpPr/>
+          <p:nvPr/>
+        </p:nvSpPr>
+        <p:spPr>
+          <a:xfrm>
+            <a:off x="12265200" y="16827840"/>
+            <a:ext cx="19474920" cy="1002960"/>
+          </a:xfrm>
+          <a:prstGeom prst="rect">
+            <a:avLst/>
+          </a:prstGeom>
+          <a:solidFill>
+            <a:srgbClr val="c6d9f1"/>
+          </a:solidFill>
+          <a:ln>
+            <a:noFill/>
+          </a:ln>
+        </p:spPr>
+        <p:txBody>
+          <a:bodyPr lIns="90000" rIns="90000" tIns="45000" bIns="45000" anchor="ctr"/>
+          <a:p>
+            <a:pPr algn="ctr">
+              <a:lnSpc>
+                <a:spcPct val="100000"/>
+              </a:lnSpc>
+            </a:pPr>
+            <a:r>
+              <a:rPr b="1" lang="en-US" sz="4000">
+                <a:solidFill>
+                  <a:srgbClr val="000000"/>
+                </a:solidFill>
+                <a:latin typeface="Century Gothic"/>
+                <a:ea typeface="Arial"/>
+              </a:rPr>
+              <a:t>Integration of Temporal Locality and Spatial Locality</a:t>
+            </a:r>
+            <a:endParaRPr/>
+          </a:p>
+        </p:txBody>
+      </p:sp>
+      <p:sp>
+        <p:nvSpPr>
+          <p:cNvPr id="409" name="CustomShape 27"/>
+          <p:cNvSpPr/>
+          <p:nvPr/>
+        </p:nvSpPr>
+        <p:spPr>
+          <a:xfrm>
+            <a:off x="12265200" y="22513680"/>
+            <a:ext cx="19471680" cy="1002960"/>
+          </a:xfrm>
+          <a:prstGeom prst="rect">
+            <a:avLst/>
+          </a:prstGeom>
+          <a:solidFill>
+            <a:srgbClr val="c6d9f1"/>
+          </a:solidFill>
+          <a:ln>
+            <a:noFill/>
+          </a:ln>
+        </p:spPr>
+        <p:txBody>
+          <a:bodyPr lIns="90000" rIns="90000" tIns="45000" bIns="45000" anchor="ctr"/>
+          <a:p>
+            <a:pPr algn="ctr">
+              <a:lnSpc>
+                <a:spcPct val="100000"/>
+              </a:lnSpc>
+            </a:pPr>
+            <a:r>
+              <a:rPr b="1" lang="en-US" sz="4000">
+                <a:solidFill>
+                  <a:srgbClr val="000000"/>
+                </a:solidFill>
+                <a:latin typeface="Century Gothic"/>
+                <a:ea typeface="Arial"/>
+              </a:rPr>
+              <a:t>Evaluation of Spatial Locality of Page Sequences</a:t>
+            </a:r>
+            <a:endParaRPr/>
+          </a:p>
+        </p:txBody>
+      </p:sp>
+      <p:sp>
+        <p:nvSpPr>
+          <p:cNvPr id="410" name="CustomShape 28"/>
+          <p:cNvSpPr/>
+          <p:nvPr/>
+        </p:nvSpPr>
+        <p:spPr>
+          <a:xfrm>
+            <a:off x="12264840" y="28483560"/>
+            <a:ext cx="19475280" cy="1002960"/>
+          </a:xfrm>
+          <a:prstGeom prst="rect">
+            <a:avLst/>
+          </a:prstGeom>
+          <a:solidFill>
+            <a:srgbClr val="c6d9f1"/>
+          </a:solidFill>
+          <a:ln>
+            <a:noFill/>
+          </a:ln>
+        </p:spPr>
+        <p:txBody>
+          <a:bodyPr lIns="90000" rIns="90000" tIns="45000" bIns="45000" anchor="ctr"/>
+          <a:p>
+            <a:pPr algn="ctr">
+              <a:lnSpc>
+                <a:spcPct val="100000"/>
+              </a:lnSpc>
+            </a:pPr>
+            <a:r>
+              <a:rPr b="1" lang="en-US" sz="4000">
+                <a:solidFill>
+                  <a:srgbClr val="000000"/>
+                </a:solidFill>
+                <a:latin typeface="Century Gothic"/>
+                <a:ea typeface="Arial"/>
+              </a:rPr>
+              <a:t>Scheduling Page Swapping</a:t>
+            </a:r>
+            <a:endParaRPr/>
+          </a:p>
+        </p:txBody>
+      </p:sp>
+      <p:sp>
+        <p:nvSpPr>
+          <p:cNvPr id="411" name="CustomShape 29"/>
+          <p:cNvSpPr/>
+          <p:nvPr/>
+        </p:nvSpPr>
+        <p:spPr>
+          <a:xfrm>
+            <a:off x="12864960" y="23907240"/>
+            <a:ext cx="18498960" cy="3250440"/>
+          </a:xfrm>
+          <a:prstGeom prst="rect">
+            <a:avLst/>
+          </a:prstGeom>
+          <a:noFill/>
+          <a:ln w="19080">
+            <a:noFill/>
+          </a:ln>
+        </p:spPr>
+        <p:txBody>
+          <a:bodyPr lIns="90000" rIns="90000" tIns="45000" bIns="45000"/>
           <a:p>
             <a:pPr>
               <a:lnSpc>
@@ -16648,7 +16815,7 @@
                 <a:latin typeface="Century Gothic"/>
                 <a:ea typeface="Arial"/>
               </a:rPr>
-              <a:t>Disk swap manages sequences with strong spatial locality and weak temporal locality, while SSD swap manages page sequences with weak spatial locality.</a:t>
+              <a:t>In order to reduce overhead and minimize time to detect page accesses, HybridSwap only records page accesses when there is a page fault.</a:t>
             </a:r>
             <a:endParaRPr/>
           </a:p>
@@ -16668,182 +16835,10 @@
                 <a:latin typeface="Century Gothic"/>
                 <a:ea typeface="Arial"/>
               </a:rPr>
-              <a:t>A variant of the LRU replacement algorithm is used, </a:t>
-            </a:r>
-            <a:r>
-              <a:rPr lang="en-US" sz="3200" u="sng">
-                <a:solidFill>
-                  <a:srgbClr val="000000"/>
-                </a:solidFill>
-                <a:latin typeface="Century Gothic"/>
-                <a:ea typeface="Arial"/>
-              </a:rPr>
-              <a:t>“similar to the 2Q replacement”</a:t>
-            </a:r>
-            <a:r>
-              <a:rPr lang="en-US" sz="3200">
-                <a:solidFill>
-                  <a:srgbClr val="000000"/>
-                </a:solidFill>
-                <a:latin typeface="Century Gothic"/>
-                <a:ea typeface="Arial"/>
-              </a:rPr>
-              <a:t>.</a:t>
-            </a:r>
-            <a:endParaRPr/>
-          </a:p>
-        </p:txBody>
-      </p:sp>
-      <p:sp>
-        <p:nvSpPr>
-          <p:cNvPr id="410" name="CustomShape 28"/>
-          <p:cNvSpPr/>
-          <p:nvPr/>
-        </p:nvSpPr>
-        <p:spPr>
-          <a:xfrm>
-            <a:off x="12265200" y="5105520"/>
-            <a:ext cx="19475280" cy="1003320"/>
-          </a:xfrm>
-          <a:prstGeom prst="rect">
-            <a:avLst/>
-          </a:prstGeom>
-          <a:solidFill>
-            <a:srgbClr val="c6d9f1"/>
-          </a:solidFill>
-          <a:ln>
-            <a:noFill/>
-          </a:ln>
-        </p:spPr>
-        <p:txBody>
-          <a:bodyPr lIns="90000" rIns="90000" tIns="45000" bIns="45000" anchor="ctr"/>
-          <a:p>
-            <a:pPr algn="ctr">
-              <a:lnSpc>
-                <a:spcPct val="100000"/>
-              </a:lnSpc>
-            </a:pPr>
-            <a:r>
-              <a:rPr b="1" lang="en-US" sz="4000">
-                <a:solidFill>
-                  <a:srgbClr val="000000"/>
-                </a:solidFill>
-                <a:latin typeface="Century Gothic"/>
-                <a:ea typeface="Arial"/>
-              </a:rPr>
-              <a:t>Integration of Temporal Locality and Spatial Locality</a:t>
-            </a:r>
-            <a:endParaRPr/>
-          </a:p>
-        </p:txBody>
-      </p:sp>
-      <p:sp>
-        <p:nvSpPr>
-          <p:cNvPr id="411" name="CustomShape 29"/>
-          <p:cNvSpPr/>
-          <p:nvPr/>
-        </p:nvSpPr>
-        <p:spPr>
-          <a:xfrm>
-            <a:off x="12268440" y="20954880"/>
-            <a:ext cx="19472040" cy="1003320"/>
-          </a:xfrm>
-          <a:prstGeom prst="rect">
-            <a:avLst/>
-          </a:prstGeom>
-          <a:solidFill>
-            <a:srgbClr val="c6d9f1"/>
-          </a:solidFill>
-          <a:ln>
-            <a:noFill/>
-          </a:ln>
-        </p:spPr>
-        <p:txBody>
-          <a:bodyPr lIns="90000" rIns="90000" tIns="45000" bIns="45000" anchor="ctr"/>
-          <a:p>
-            <a:pPr algn="ctr">
-              <a:lnSpc>
-                <a:spcPct val="100000"/>
-              </a:lnSpc>
-            </a:pPr>
-            <a:r>
-              <a:rPr b="1" lang="en-US" sz="4000">
-                <a:solidFill>
-                  <a:srgbClr val="000000"/>
-                </a:solidFill>
-                <a:latin typeface="Century Gothic"/>
-                <a:ea typeface="Arial"/>
-              </a:rPr>
-              <a:t>Evaluation of Spatial Locality of Page Sequences</a:t>
-            </a:r>
-            <a:endParaRPr/>
-          </a:p>
-        </p:txBody>
-      </p:sp>
-      <p:sp>
-        <p:nvSpPr>
-          <p:cNvPr id="412" name="CustomShape 30"/>
-          <p:cNvSpPr/>
-          <p:nvPr/>
-        </p:nvSpPr>
-        <p:spPr>
-          <a:xfrm>
-            <a:off x="12264840" y="28483560"/>
-            <a:ext cx="19475640" cy="1003320"/>
-          </a:xfrm>
-          <a:prstGeom prst="rect">
-            <a:avLst/>
-          </a:prstGeom>
-          <a:solidFill>
-            <a:srgbClr val="c6d9f1"/>
-          </a:solidFill>
-          <a:ln>
-            <a:noFill/>
-          </a:ln>
-        </p:spPr>
-        <p:txBody>
-          <a:bodyPr lIns="90000" rIns="90000" tIns="45000" bIns="45000" anchor="ctr"/>
-          <a:p>
-            <a:pPr algn="ctr">
-              <a:lnSpc>
-                <a:spcPct val="100000"/>
-              </a:lnSpc>
-            </a:pPr>
-            <a:r>
-              <a:rPr b="1" lang="en-US" sz="4000">
-                <a:solidFill>
-                  <a:srgbClr val="000000"/>
-                </a:solidFill>
-                <a:latin typeface="Century Gothic"/>
-                <a:ea typeface="Arial"/>
-              </a:rPr>
-              <a:t>Scheduling Page Swapping</a:t>
-            </a:r>
-            <a:endParaRPr/>
-          </a:p>
-        </p:txBody>
-      </p:sp>
-      <p:sp>
-        <p:nvSpPr>
-          <p:cNvPr id="413" name="CustomShape 31"/>
-          <p:cNvSpPr/>
-          <p:nvPr/>
-        </p:nvSpPr>
-        <p:spPr>
-          <a:xfrm>
-            <a:off x="12863520" y="22168080"/>
-            <a:ext cx="18499320" cy="3250800"/>
-          </a:xfrm>
-          <a:prstGeom prst="rect">
-            <a:avLst/>
-          </a:prstGeom>
-          <a:noFill/>
-          <a:ln w="19080">
-            <a:noFill/>
-          </a:ln>
-        </p:spPr>
-        <p:txBody>
-          <a:bodyPr lIns="90000" rIns="90000" tIns="45000" bIns="45000"/>
+              <a:t>The lifetime of a page at swap-out is considered to be the most recent time between page accesses (swap-in and current time).</a:t>
+            </a:r>
+            <a:endParaRPr/>
+          </a:p>
           <a:p>
             <a:pPr>
               <a:lnSpc>
@@ -16860,10 +16855,43 @@
                 <a:latin typeface="Century Gothic"/>
                 <a:ea typeface="Arial"/>
               </a:rPr>
-              <a:t>In order to reduce overhead and minimize time to detect page accesses, HybridSwap only records page accesses when there is a page fault.</a:t>
-            </a:r>
-            <a:endParaRPr/>
-          </a:p>
+              <a:t>A sequence of pages is swapped to disk only</a:t>
+            </a:r>
+            <a:r>
+              <a:rPr lang="en-US" sz="3200" u="sng">
+                <a:solidFill>
+                  <a:srgbClr val="000000"/>
+                </a:solidFill>
+                <a:latin typeface="Century Gothic"/>
+                <a:ea typeface="Arial"/>
+              </a:rPr>
+              <a:t> “If the difference between any two pages' access times is” less “than the system's current average lifetime,” and “ if some anonymous pages in the sequence ... have access times.”</a:t>
+            </a:r>
+            <a:endParaRPr/>
+          </a:p>
+        </p:txBody>
+      </p:sp>
+      <p:sp>
+        <p:nvSpPr>
+          <p:cNvPr id="412" name="CustomShape 30"/>
+          <p:cNvSpPr/>
+          <p:nvPr/>
+        </p:nvSpPr>
+        <p:spPr>
+          <a:xfrm>
+            <a:off x="12618720" y="29666160"/>
+            <a:ext cx="18498960" cy="3250440"/>
+          </a:xfrm>
+          <a:prstGeom prst="rect">
+            <a:avLst/>
+          </a:prstGeom>
+          <a:noFill/>
+          <a:ln w="19080">
+            <a:noFill/>
+          </a:ln>
+        </p:spPr>
+        <p:txBody>
+          <a:bodyPr lIns="90000" rIns="90000" tIns="45000" bIns="45000"/>
           <a:p>
             <a:pPr>
               <a:lnSpc>
@@ -16880,7 +16908,7 @@
                 <a:latin typeface="Century Gothic"/>
                 <a:ea typeface="Arial"/>
               </a:rPr>
-              <a:t>The lifetime of a page at swap-out is considered to be the most recent time between page accesses (swap-in and current time).</a:t>
+              <a:t>In the range of the last N pages in the inactive list of pages, a process's pages are replaced in each swap.</a:t>
             </a:r>
             <a:endParaRPr/>
           </a:p>
@@ -16900,79 +16928,6 @@
                 <a:latin typeface="Century Gothic"/>
                 <a:ea typeface="Arial"/>
               </a:rPr>
-              <a:t>A sequence of pages is swapped to disk only</a:t>
-            </a:r>
-            <a:r>
-              <a:rPr lang="en-US" sz="3200" u="sng">
-                <a:solidFill>
-                  <a:srgbClr val="000000"/>
-                </a:solidFill>
-                <a:latin typeface="Century Gothic"/>
-                <a:ea typeface="Arial"/>
-              </a:rPr>
-              <a:t> “If the difference between any two pages' access times is” less “than the system's current average lifetime,” and “ if some anonymous pages in the sequence ... have access times.”</a:t>
-            </a:r>
-            <a:endParaRPr/>
-          </a:p>
-        </p:txBody>
-      </p:sp>
-      <p:sp>
-        <p:nvSpPr>
-          <p:cNvPr id="414" name="CustomShape 32"/>
-          <p:cNvSpPr/>
-          <p:nvPr/>
-        </p:nvSpPr>
-        <p:spPr>
-          <a:xfrm>
-            <a:off x="12618720" y="29666160"/>
-            <a:ext cx="18499320" cy="3250800"/>
-          </a:xfrm>
-          <a:prstGeom prst="rect">
-            <a:avLst/>
-          </a:prstGeom>
-          <a:noFill/>
-          <a:ln w="19080">
-            <a:noFill/>
-          </a:ln>
-        </p:spPr>
-        <p:txBody>
-          <a:bodyPr lIns="90000" rIns="90000" tIns="45000" bIns="45000"/>
-          <a:p>
-            <a:pPr>
-              <a:lnSpc>
-                <a:spcPct val="100000"/>
-              </a:lnSpc>
-              <a:buFont typeface="Wingdings" charset="2"/>
-              <a:buChar char=""/>
-            </a:pPr>
-            <a:r>
-              <a:rPr lang="en-US" sz="3200">
-                <a:solidFill>
-                  <a:srgbClr val="000000"/>
-                </a:solidFill>
-                <a:latin typeface="Century Gothic"/>
-                <a:ea typeface="Arial"/>
-              </a:rPr>
-              <a:t>In the range of the last N pages in the inactive list of pages, a process's pages are replaced in each swap.</a:t>
-            </a:r>
-            <a:endParaRPr/>
-          </a:p>
-          <a:p>
-            <a:pPr>
-              <a:lnSpc>
-                <a:spcPct val="100000"/>
-              </a:lnSpc>
-              <a:buFont typeface="Wingdings" charset="2"/>
-              <a:buChar char=""/>
-            </a:pPr>
-            <a:r>
-              <a:rPr lang="en-US" sz="3200">
-                <a:solidFill>
-                  <a:srgbClr val="000000"/>
-                </a:solidFill>
-                <a:latin typeface="Century Gothic"/>
-                <a:ea typeface="Arial"/>
-              </a:rPr>
               <a:t>N must be small enough to avoid swapping too many recently used pages, but large enough to add disk efficiency.</a:t>
             </a:r>
             <a:endParaRPr/>
@@ -16981,7 +16936,7 @@
       </p:sp>
       <p:pic>
         <p:nvPicPr>
-          <p:cNvPr id="415" name="" descr=""/>
+          <p:cNvPr id="413" name="" descr=""/>
           <p:cNvPicPr/>
           <p:nvPr/>
         </p:nvPicPr>
@@ -16994,7 +16949,7 @@
         <p:spPr>
           <a:xfrm>
             <a:off x="32194800" y="7680960"/>
-            <a:ext cx="11693880" cy="6217920"/>
+            <a:ext cx="11693520" cy="6217560"/>
           </a:xfrm>
           <a:prstGeom prst="rect">
             <a:avLst/>
@@ -17004,6 +16959,160 @@
           </a:ln>
         </p:spPr>
       </p:pic>
+      <p:sp>
+        <p:nvSpPr>
+          <p:cNvPr id="414" name="CustomShape 31"/>
+          <p:cNvSpPr/>
+          <p:nvPr/>
+        </p:nvSpPr>
+        <p:spPr>
+          <a:xfrm>
+            <a:off x="12265200" y="5106600"/>
+            <a:ext cx="19474920" cy="1002960"/>
+          </a:xfrm>
+          <a:prstGeom prst="rect">
+            <a:avLst/>
+          </a:prstGeom>
+          <a:solidFill>
+            <a:srgbClr val="c6d9f1"/>
+          </a:solidFill>
+          <a:ln>
+            <a:noFill/>
+          </a:ln>
+        </p:spPr>
+        <p:txBody>
+          <a:bodyPr lIns="90000" rIns="90000" tIns="45000" bIns="45000" anchor="ctr"/>
+          <a:p>
+            <a:pPr algn="ctr">
+              <a:lnSpc>
+                <a:spcPct val="100000"/>
+              </a:lnSpc>
+            </a:pPr>
+            <a:r>
+              <a:rPr b="1" lang="en-US" sz="4000">
+                <a:solidFill>
+                  <a:srgbClr val="000000"/>
+                </a:solidFill>
+                <a:latin typeface="Century Gothic"/>
+                <a:ea typeface="Arial"/>
+              </a:rPr>
+              <a:t>Our Solution: HybridSwap</a:t>
+            </a:r>
+            <a:endParaRPr/>
+          </a:p>
+        </p:txBody>
+      </p:sp>
+      <p:sp>
+        <p:nvSpPr>
+          <p:cNvPr id="415" name="CustomShape 32"/>
+          <p:cNvSpPr/>
+          <p:nvPr/>
+        </p:nvSpPr>
+        <p:spPr>
+          <a:xfrm>
+            <a:off x="12682080" y="6309360"/>
+            <a:ext cx="10909440" cy="5760720"/>
+          </a:xfrm>
+          <a:prstGeom prst="rect">
+            <a:avLst/>
+          </a:prstGeom>
+          <a:noFill/>
+          <a:ln w="19080">
+            <a:noFill/>
+          </a:ln>
+        </p:spPr>
+        <p:txBody>
+          <a:bodyPr lIns="90000" rIns="90000" tIns="45000" bIns="45000"/>
+          <a:p>
+            <a:pPr>
+              <a:lnSpc>
+                <a:spcPct val="100000"/>
+              </a:lnSpc>
+              <a:buFont typeface="Wingdings" charset="2"/>
+              <a:buChar char=""/>
+            </a:pPr>
+            <a:r>
+              <a:rPr lang="en-US" sz="3200">
+                <a:solidFill>
+                  <a:srgbClr val="000000"/>
+                </a:solidFill>
+                <a:latin typeface="Century Gothic"/>
+                <a:ea typeface="Arial"/>
+              </a:rPr>
+              <a:t>Disk manages sequential reads and SSD manages random reads.</a:t>
+            </a:r>
+            <a:endParaRPr/>
+          </a:p>
+          <a:p>
+            <a:pPr>
+              <a:lnSpc>
+                <a:spcPct val="100000"/>
+              </a:lnSpc>
+              <a:buFont typeface="Wingdings" charset="2"/>
+              <a:buChar char=""/>
+            </a:pPr>
+            <a:r>
+              <a:rPr lang="en-US" sz="3200">
+                <a:solidFill>
+                  <a:srgbClr val="000000"/>
+                </a:solidFill>
+                <a:latin typeface="Century Gothic"/>
+                <a:ea typeface="Arial"/>
+              </a:rPr>
+              <a:t>SSD provides enhanced performance, while disk allows a longer lifetime for SSD, thus combining the advantages of both.</a:t>
+            </a:r>
+            <a:endParaRPr/>
+          </a:p>
+          <a:p>
+            <a:pPr>
+              <a:lnSpc>
+                <a:spcPct val="100000"/>
+              </a:lnSpc>
+              <a:buFont typeface="Wingdings" charset="2"/>
+              <a:buChar char=""/>
+            </a:pPr>
+            <a:r>
+              <a:rPr lang="en-US" sz="3200">
+                <a:solidFill>
+                  <a:srgbClr val="dd4814"/>
+                </a:solidFill>
+                <a:latin typeface="Century Gothic"/>
+                <a:ea typeface="Arial"/>
+              </a:rPr>
+              <a:t>TODO: Make this a </a:t>
+            </a:r>
+            <a:r>
+              <a:rPr b="1" lang="en-US" sz="3200">
+                <a:solidFill>
+                  <a:srgbClr val="dd4814"/>
+                </a:solidFill>
+                <a:latin typeface="Century Gothic"/>
+                <a:ea typeface="Arial"/>
+              </a:rPr>
+              <a:t>diagram/picture</a:t>
+            </a:r>
+            <a:r>
+              <a:rPr lang="en-US" sz="3200">
+                <a:solidFill>
+                  <a:srgbClr val="dd4814"/>
+                </a:solidFill>
+                <a:latin typeface="Century Gothic"/>
+                <a:ea typeface="Arial"/>
+              </a:rPr>
+              <a:t>! HybridSwap first chooses a sequence of pages, then determines whether the sequence's spatial locality is below a threshold, and finally gives destinations for swapping.</a:t>
+            </a:r>
+            <a:endParaRPr/>
+          </a:p>
+          <a:p>
+            <a:pPr>
+              <a:lnSpc>
+                <a:spcPct val="100000"/>
+              </a:lnSpc>
+            </a:pPr>
+            <a:endParaRPr/>
+          </a:p>
+        </p:txBody>
+      </p:sp>
     </p:spTree>
   </p:cSld>
   <p:timing>
@@ -17062,7 +17171,7 @@
         <p:spPr>
           <a:xfrm>
             <a:off x="2194560" y="1313280"/>
-            <a:ext cx="39500280" cy="5495760"/>
+            <a:ext cx="39499920" cy="5495400"/>
           </a:xfrm>
           <a:prstGeom prst="rect">
             <a:avLst/>
@@ -17082,7 +17191,7 @@
         <p:spPr>
           <a:xfrm>
             <a:off x="2194560" y="7702560"/>
-            <a:ext cx="39500280" cy="19090800"/>
+            <a:ext cx="39499920" cy="19090440"/>
           </a:xfrm>
           <a:prstGeom prst="rect">
             <a:avLst/>
@@ -17102,7 +17211,7 @@
         <p:spPr>
           <a:xfrm>
             <a:off x="2194560" y="7702560"/>
-            <a:ext cx="39500280" cy="19090800"/>
+            <a:ext cx="39499920" cy="19090440"/>
           </a:xfrm>
           <a:prstGeom prst="rect">
             <a:avLst/>
@@ -17128,7 +17237,7 @@
         <p:spPr>
           <a:xfrm>
             <a:off x="9980640" y="7702560"/>
-            <a:ext cx="23927400" cy="19090800"/>
+            <a:ext cx="23927040" cy="19090440"/>
           </a:xfrm>
           <a:prstGeom prst="rect">
             <a:avLst/>
@@ -17153,7 +17262,7 @@
         <p:spPr>
           <a:xfrm>
             <a:off x="9980640" y="7702560"/>
-            <a:ext cx="23927400" cy="19090800"/>
+            <a:ext cx="23927040" cy="19090440"/>
           </a:xfrm>
           <a:prstGeom prst="rect">
             <a:avLst/>
@@ -17163,6 +17272,607 @@
           </a:ln>
         </p:spPr>
       </p:pic>
+    </p:spTree>
+  </p:cSld>
+</p:sld>
+</file>
+
+<file path=ppt/slides/slide11.xml><?xml version="1.0" encoding="utf-8"?>
+<p:sld xmlns:a="http://schemas.openxmlformats.org/drawingml/2006/main" xmlns:p="http://schemas.openxmlformats.org/presentationml/2006/main" xmlns:r="http://schemas.openxmlformats.org/officeDocument/2006/relationships">
+  <p:cSld>
+    <p:spTree>
+      <p:nvGrpSpPr>
+        <p:cNvPr id="1" name=""/>
+        <p:cNvGrpSpPr/>
+        <p:nvPr/>
+      </p:nvGrpSpPr>
+      <p:grpSpPr>
+        <a:xfrm>
+          <a:off x="0" y="0"/>
+          <a:ext cx="0" cy="0"/>
+          <a:chOff x="0" y="0"/>
+          <a:chExt cx="0" cy="0"/>
+        </a:xfrm>
+      </p:grpSpPr>
+      <p:sp>
+        <p:nvSpPr>
+          <p:cNvPr id="452" name="TextShape 1"/>
+          <p:cNvSpPr txBox="1"/>
+          <p:nvPr/>
+        </p:nvSpPr>
+        <p:spPr>
+          <a:xfrm>
+            <a:off x="2194560" y="1313280"/>
+            <a:ext cx="39501720" cy="5497200"/>
+          </a:xfrm>
+          <a:prstGeom prst="rect">
+            <a:avLst/>
+          </a:prstGeom>
+        </p:spPr>
+        <p:txBody>
+          <a:bodyPr lIns="0" rIns="0" tIns="0" bIns="0" anchor="ctr"/>
+          <a:p>
+            <a:pPr algn="ctr"/>
+            <a:endParaRPr/>
+          </a:p>
+        </p:txBody>
+      </p:sp>
+      <p:sp>
+        <p:nvSpPr>
+          <p:cNvPr id="453" name="TextShape 2"/>
+          <p:cNvSpPr txBox="1"/>
+          <p:nvPr/>
+        </p:nvSpPr>
+        <p:spPr>
+          <a:xfrm>
+            <a:off x="2194560" y="7702560"/>
+            <a:ext cx="19276560" cy="19092240"/>
+          </a:xfrm>
+          <a:prstGeom prst="rect">
+            <a:avLst/>
+          </a:prstGeom>
+        </p:spPr>
+        <p:txBody>
+          <a:bodyPr lIns="0" rIns="0" tIns="0" bIns="0"/>
+          <a:p>
+            <a:endParaRPr/>
+          </a:p>
+        </p:txBody>
+      </p:sp>
+      <p:sp>
+        <p:nvSpPr>
+          <p:cNvPr id="454" name="TextShape 3"/>
+          <p:cNvSpPr txBox="1"/>
+          <p:nvPr/>
+        </p:nvSpPr>
+        <p:spPr>
+          <a:xfrm>
+            <a:off x="22435200" y="7702560"/>
+            <a:ext cx="19276560" cy="19092240"/>
+          </a:xfrm>
+          <a:prstGeom prst="rect">
+            <a:avLst/>
+          </a:prstGeom>
+        </p:spPr>
+        <p:txBody>
+          <a:bodyPr lIns="0" rIns="0" tIns="0" bIns="0"/>
+          <a:p>
+            <a:endParaRPr/>
+          </a:p>
+        </p:txBody>
+      </p:sp>
+    </p:spTree>
+  </p:cSld>
+</p:sld>
+</file>
+
+<file path=ppt/slides/slide12.xml><?xml version="1.0" encoding="utf-8"?>
+<p:sld xmlns:a="http://schemas.openxmlformats.org/drawingml/2006/main" xmlns:p="http://schemas.openxmlformats.org/presentationml/2006/main" xmlns:r="http://schemas.openxmlformats.org/officeDocument/2006/relationships">
+  <p:cSld>
+    <p:spTree>
+      <p:nvGrpSpPr>
+        <p:cNvPr id="1" name=""/>
+        <p:cNvGrpSpPr/>
+        <p:nvPr/>
+      </p:nvGrpSpPr>
+      <p:grpSpPr>
+        <a:xfrm>
+          <a:off x="0" y="0"/>
+          <a:ext cx="0" cy="0"/>
+          <a:chOff x="0" y="0"/>
+          <a:chExt cx="0" cy="0"/>
+        </a:xfrm>
+      </p:grpSpPr>
+      <p:sp>
+        <p:nvSpPr>
+          <p:cNvPr id="455" name="TextShape 1"/>
+          <p:cNvSpPr txBox="1"/>
+          <p:nvPr/>
+        </p:nvSpPr>
+        <p:spPr>
+          <a:xfrm>
+            <a:off x="2194560" y="1313280"/>
+            <a:ext cx="39501720" cy="5497200"/>
+          </a:xfrm>
+          <a:prstGeom prst="rect">
+            <a:avLst/>
+          </a:prstGeom>
+        </p:spPr>
+        <p:txBody>
+          <a:bodyPr lIns="0" rIns="0" tIns="0" bIns="0" anchor="ctr"/>
+          <a:p>
+            <a:pPr algn="ctr"/>
+            <a:endParaRPr/>
+          </a:p>
+        </p:txBody>
+      </p:sp>
+    </p:spTree>
+  </p:cSld>
+</p:sld>
+</file>
+
+<file path=ppt/slides/slide13.xml><?xml version="1.0" encoding="utf-8"?>
+<p:sld xmlns:a="http://schemas.openxmlformats.org/drawingml/2006/main" xmlns:p="http://schemas.openxmlformats.org/presentationml/2006/main" xmlns:r="http://schemas.openxmlformats.org/officeDocument/2006/relationships">
+  <p:cSld>
+    <p:spTree>
+      <p:nvGrpSpPr>
+        <p:cNvPr id="1" name=""/>
+        <p:cNvGrpSpPr/>
+        <p:nvPr/>
+      </p:nvGrpSpPr>
+      <p:grpSpPr>
+        <a:xfrm>
+          <a:off x="0" y="0"/>
+          <a:ext cx="0" cy="0"/>
+          <a:chOff x="0" y="0"/>
+          <a:chExt cx="0" cy="0"/>
+        </a:xfrm>
+      </p:grpSpPr>
+      <p:sp>
+        <p:nvSpPr>
+          <p:cNvPr id="456" name="TextShape 1"/>
+          <p:cNvSpPr txBox="1"/>
+          <p:nvPr/>
+        </p:nvSpPr>
+        <p:spPr>
+          <a:xfrm>
+            <a:off x="2194560" y="1313280"/>
+            <a:ext cx="39501720" cy="25481880"/>
+          </a:xfrm>
+          <a:prstGeom prst="rect">
+            <a:avLst/>
+          </a:prstGeom>
+        </p:spPr>
+        <p:txBody>
+          <a:bodyPr lIns="0" rIns="0" tIns="0" bIns="0" anchor="ctr"/>
+          <a:p>
+            <a:pPr algn="ctr"/>
+            <a:endParaRPr/>
+          </a:p>
+        </p:txBody>
+      </p:sp>
+    </p:spTree>
+  </p:cSld>
+</p:sld>
+</file>
+
+<file path=ppt/slides/slide14.xml><?xml version="1.0" encoding="utf-8"?>
+<p:sld xmlns:a="http://schemas.openxmlformats.org/drawingml/2006/main" xmlns:p="http://schemas.openxmlformats.org/presentationml/2006/main" xmlns:r="http://schemas.openxmlformats.org/officeDocument/2006/relationships">
+  <p:cSld>
+    <p:spTree>
+      <p:nvGrpSpPr>
+        <p:cNvPr id="1" name=""/>
+        <p:cNvGrpSpPr/>
+        <p:nvPr/>
+      </p:nvGrpSpPr>
+      <p:grpSpPr>
+        <a:xfrm>
+          <a:off x="0" y="0"/>
+          <a:ext cx="0" cy="0"/>
+          <a:chOff x="0" y="0"/>
+          <a:chExt cx="0" cy="0"/>
+        </a:xfrm>
+      </p:grpSpPr>
+      <p:sp>
+        <p:nvSpPr>
+          <p:cNvPr id="457" name="TextShape 1"/>
+          <p:cNvSpPr txBox="1"/>
+          <p:nvPr/>
+        </p:nvSpPr>
+        <p:spPr>
+          <a:xfrm>
+            <a:off x="2194560" y="1313280"/>
+            <a:ext cx="39501720" cy="5497200"/>
+          </a:xfrm>
+          <a:prstGeom prst="rect">
+            <a:avLst/>
+          </a:prstGeom>
+        </p:spPr>
+        <p:txBody>
+          <a:bodyPr lIns="0" rIns="0" tIns="0" bIns="0" anchor="ctr"/>
+          <a:p>
+            <a:pPr algn="ctr"/>
+            <a:endParaRPr/>
+          </a:p>
+        </p:txBody>
+      </p:sp>
+      <p:sp>
+        <p:nvSpPr>
+          <p:cNvPr id="458" name="TextShape 2"/>
+          <p:cNvSpPr txBox="1"/>
+          <p:nvPr/>
+        </p:nvSpPr>
+        <p:spPr>
+          <a:xfrm>
+            <a:off x="2194560" y="7702560"/>
+            <a:ext cx="19276560" cy="9106920"/>
+          </a:xfrm>
+          <a:prstGeom prst="rect">
+            <a:avLst/>
+          </a:prstGeom>
+        </p:spPr>
+        <p:txBody>
+          <a:bodyPr lIns="0" rIns="0" tIns="0" bIns="0"/>
+          <a:p>
+            <a:endParaRPr/>
+          </a:p>
+        </p:txBody>
+      </p:sp>
+      <p:sp>
+        <p:nvSpPr>
+          <p:cNvPr id="459" name="TextShape 3"/>
+          <p:cNvSpPr txBox="1"/>
+          <p:nvPr/>
+        </p:nvSpPr>
+        <p:spPr>
+          <a:xfrm>
+            <a:off x="2194560" y="17674920"/>
+            <a:ext cx="19276560" cy="9106920"/>
+          </a:xfrm>
+          <a:prstGeom prst="rect">
+            <a:avLst/>
+          </a:prstGeom>
+        </p:spPr>
+        <p:txBody>
+          <a:bodyPr lIns="0" rIns="0" tIns="0" bIns="0"/>
+          <a:p>
+            <a:endParaRPr/>
+          </a:p>
+        </p:txBody>
+      </p:sp>
+      <p:sp>
+        <p:nvSpPr>
+          <p:cNvPr id="460" name="TextShape 4"/>
+          <p:cNvSpPr txBox="1"/>
+          <p:nvPr/>
+        </p:nvSpPr>
+        <p:spPr>
+          <a:xfrm>
+            <a:off x="22435200" y="7702560"/>
+            <a:ext cx="19276560" cy="19092240"/>
+          </a:xfrm>
+          <a:prstGeom prst="rect">
+            <a:avLst/>
+          </a:prstGeom>
+        </p:spPr>
+        <p:txBody>
+          <a:bodyPr lIns="0" rIns="0" tIns="0" bIns="0"/>
+          <a:p>
+            <a:endParaRPr/>
+          </a:p>
+        </p:txBody>
+      </p:sp>
+    </p:spTree>
+  </p:cSld>
+</p:sld>
+</file>
+
+<file path=ppt/slides/slide15.xml><?xml version="1.0" encoding="utf-8"?>
+<p:sld xmlns:a="http://schemas.openxmlformats.org/drawingml/2006/main" xmlns:p="http://schemas.openxmlformats.org/presentationml/2006/main" xmlns:r="http://schemas.openxmlformats.org/officeDocument/2006/relationships">
+  <p:cSld>
+    <p:spTree>
+      <p:nvGrpSpPr>
+        <p:cNvPr id="1" name=""/>
+        <p:cNvGrpSpPr/>
+        <p:nvPr/>
+      </p:nvGrpSpPr>
+      <p:grpSpPr>
+        <a:xfrm>
+          <a:off x="0" y="0"/>
+          <a:ext cx="0" cy="0"/>
+          <a:chOff x="0" y="0"/>
+          <a:chExt cx="0" cy="0"/>
+        </a:xfrm>
+      </p:grpSpPr>
+      <p:sp>
+        <p:nvSpPr>
+          <p:cNvPr id="461" name="TextShape 1"/>
+          <p:cNvSpPr txBox="1"/>
+          <p:nvPr/>
+        </p:nvSpPr>
+        <p:spPr>
+          <a:xfrm>
+            <a:off x="2194560" y="1313280"/>
+            <a:ext cx="39501720" cy="5497200"/>
+          </a:xfrm>
+          <a:prstGeom prst="rect">
+            <a:avLst/>
+          </a:prstGeom>
+        </p:spPr>
+        <p:txBody>
+          <a:bodyPr lIns="0" rIns="0" tIns="0" bIns="0" anchor="ctr"/>
+          <a:p>
+            <a:pPr algn="ctr"/>
+            <a:endParaRPr/>
+          </a:p>
+        </p:txBody>
+      </p:sp>
+      <p:sp>
+        <p:nvSpPr>
+          <p:cNvPr id="462" name="TextShape 2"/>
+          <p:cNvSpPr txBox="1"/>
+          <p:nvPr/>
+        </p:nvSpPr>
+        <p:spPr>
+          <a:xfrm>
+            <a:off x="2194560" y="7702560"/>
+            <a:ext cx="19276560" cy="19092240"/>
+          </a:xfrm>
+          <a:prstGeom prst="rect">
+            <a:avLst/>
+          </a:prstGeom>
+        </p:spPr>
+        <p:txBody>
+          <a:bodyPr lIns="0" rIns="0" tIns="0" bIns="0"/>
+          <a:p>
+            <a:endParaRPr/>
+          </a:p>
+        </p:txBody>
+      </p:sp>
+      <p:sp>
+        <p:nvSpPr>
+          <p:cNvPr id="463" name="TextShape 3"/>
+          <p:cNvSpPr txBox="1"/>
+          <p:nvPr/>
+        </p:nvSpPr>
+        <p:spPr>
+          <a:xfrm>
+            <a:off x="22435200" y="7702560"/>
+            <a:ext cx="19276560" cy="9106920"/>
+          </a:xfrm>
+          <a:prstGeom prst="rect">
+            <a:avLst/>
+          </a:prstGeom>
+        </p:spPr>
+        <p:txBody>
+          <a:bodyPr lIns="0" rIns="0" tIns="0" bIns="0"/>
+          <a:p>
+            <a:endParaRPr/>
+          </a:p>
+        </p:txBody>
+      </p:sp>
+      <p:sp>
+        <p:nvSpPr>
+          <p:cNvPr id="464" name="TextShape 4"/>
+          <p:cNvSpPr txBox="1"/>
+          <p:nvPr/>
+        </p:nvSpPr>
+        <p:spPr>
+          <a:xfrm>
+            <a:off x="22435200" y="17674920"/>
+            <a:ext cx="19276560" cy="9106920"/>
+          </a:xfrm>
+          <a:prstGeom prst="rect">
+            <a:avLst/>
+          </a:prstGeom>
+        </p:spPr>
+        <p:txBody>
+          <a:bodyPr lIns="0" rIns="0" tIns="0" bIns="0"/>
+          <a:p>
+            <a:endParaRPr/>
+          </a:p>
+        </p:txBody>
+      </p:sp>
+    </p:spTree>
+  </p:cSld>
+</p:sld>
+</file>
+
+<file path=ppt/slides/slide16.xml><?xml version="1.0" encoding="utf-8"?>
+<p:sld xmlns:a="http://schemas.openxmlformats.org/drawingml/2006/main" xmlns:p="http://schemas.openxmlformats.org/presentationml/2006/main" xmlns:r="http://schemas.openxmlformats.org/officeDocument/2006/relationships">
+  <p:cSld>
+    <p:spTree>
+      <p:nvGrpSpPr>
+        <p:cNvPr id="1" name=""/>
+        <p:cNvGrpSpPr/>
+        <p:nvPr/>
+      </p:nvGrpSpPr>
+      <p:grpSpPr>
+        <a:xfrm>
+          <a:off x="0" y="0"/>
+          <a:ext cx="0" cy="0"/>
+          <a:chOff x="0" y="0"/>
+          <a:chExt cx="0" cy="0"/>
+        </a:xfrm>
+      </p:grpSpPr>
+      <p:sp>
+        <p:nvSpPr>
+          <p:cNvPr id="465" name="TextShape 1"/>
+          <p:cNvSpPr txBox="1"/>
+          <p:nvPr/>
+        </p:nvSpPr>
+        <p:spPr>
+          <a:xfrm>
+            <a:off x="2194560" y="1313280"/>
+            <a:ext cx="39501720" cy="5497200"/>
+          </a:xfrm>
+          <a:prstGeom prst="rect">
+            <a:avLst/>
+          </a:prstGeom>
+        </p:spPr>
+        <p:txBody>
+          <a:bodyPr lIns="0" rIns="0" tIns="0" bIns="0" anchor="ctr"/>
+          <a:p>
+            <a:pPr algn="ctr"/>
+            <a:endParaRPr/>
+          </a:p>
+        </p:txBody>
+      </p:sp>
+      <p:sp>
+        <p:nvSpPr>
+          <p:cNvPr id="466" name="TextShape 2"/>
+          <p:cNvSpPr txBox="1"/>
+          <p:nvPr/>
+        </p:nvSpPr>
+        <p:spPr>
+          <a:xfrm>
+            <a:off x="2194560" y="7702560"/>
+            <a:ext cx="19276560" cy="9106920"/>
+          </a:xfrm>
+          <a:prstGeom prst="rect">
+            <a:avLst/>
+          </a:prstGeom>
+        </p:spPr>
+        <p:txBody>
+          <a:bodyPr lIns="0" rIns="0" tIns="0" bIns="0"/>
+          <a:p>
+            <a:endParaRPr/>
+          </a:p>
+        </p:txBody>
+      </p:sp>
+      <p:sp>
+        <p:nvSpPr>
+          <p:cNvPr id="467" name="TextShape 3"/>
+          <p:cNvSpPr txBox="1"/>
+          <p:nvPr/>
+        </p:nvSpPr>
+        <p:spPr>
+          <a:xfrm>
+            <a:off x="22435200" y="7702560"/>
+            <a:ext cx="19276560" cy="9106920"/>
+          </a:xfrm>
+          <a:prstGeom prst="rect">
+            <a:avLst/>
+          </a:prstGeom>
+        </p:spPr>
+        <p:txBody>
+          <a:bodyPr lIns="0" rIns="0" tIns="0" bIns="0"/>
+          <a:p>
+            <a:endParaRPr/>
+          </a:p>
+        </p:txBody>
+      </p:sp>
+      <p:sp>
+        <p:nvSpPr>
+          <p:cNvPr id="468" name="TextShape 4"/>
+          <p:cNvSpPr txBox="1"/>
+          <p:nvPr/>
+        </p:nvSpPr>
+        <p:spPr>
+          <a:xfrm>
+            <a:off x="2194560" y="17674920"/>
+            <a:ext cx="39501720" cy="9106920"/>
+          </a:xfrm>
+          <a:prstGeom prst="rect">
+            <a:avLst/>
+          </a:prstGeom>
+        </p:spPr>
+        <p:txBody>
+          <a:bodyPr lIns="0" rIns="0" tIns="0" bIns="0"/>
+          <a:p>
+            <a:endParaRPr/>
+          </a:p>
+        </p:txBody>
+      </p:sp>
+    </p:spTree>
+  </p:cSld>
+</p:sld>
+</file>
+
+<file path=ppt/slides/slide17.xml><?xml version="1.0" encoding="utf-8"?>
+<p:sld xmlns:a="http://schemas.openxmlformats.org/drawingml/2006/main" xmlns:p="http://schemas.openxmlformats.org/presentationml/2006/main" xmlns:r="http://schemas.openxmlformats.org/officeDocument/2006/relationships">
+  <p:cSld>
+    <p:spTree>
+      <p:nvGrpSpPr>
+        <p:cNvPr id="1" name=""/>
+        <p:cNvGrpSpPr/>
+        <p:nvPr/>
+      </p:nvGrpSpPr>
+      <p:grpSpPr>
+        <a:xfrm>
+          <a:off x="0" y="0"/>
+          <a:ext cx="0" cy="0"/>
+          <a:chOff x="0" y="0"/>
+          <a:chExt cx="0" cy="0"/>
+        </a:xfrm>
+      </p:grpSpPr>
+      <p:sp>
+        <p:nvSpPr>
+          <p:cNvPr id="469" name="TextShape 1"/>
+          <p:cNvSpPr txBox="1"/>
+          <p:nvPr/>
+        </p:nvSpPr>
+        <p:spPr>
+          <a:xfrm>
+            <a:off x="2194560" y="1313280"/>
+            <a:ext cx="39501720" cy="5497200"/>
+          </a:xfrm>
+          <a:prstGeom prst="rect">
+            <a:avLst/>
+          </a:prstGeom>
+        </p:spPr>
+        <p:txBody>
+          <a:bodyPr lIns="0" rIns="0" tIns="0" bIns="0" anchor="ctr"/>
+          <a:p>
+            <a:pPr algn="ctr"/>
+            <a:endParaRPr/>
+          </a:p>
+        </p:txBody>
+      </p:sp>
+      <p:sp>
+        <p:nvSpPr>
+          <p:cNvPr id="470" name="TextShape 2"/>
+          <p:cNvSpPr txBox="1"/>
+          <p:nvPr/>
+        </p:nvSpPr>
+        <p:spPr>
+          <a:xfrm>
+            <a:off x="2194560" y="7702560"/>
+            <a:ext cx="39501720" cy="9106920"/>
+          </a:xfrm>
+          <a:prstGeom prst="rect">
+            <a:avLst/>
+          </a:prstGeom>
+        </p:spPr>
+        <p:txBody>
+          <a:bodyPr lIns="0" rIns="0" tIns="0" bIns="0"/>
+          <a:p>
+            <a:endParaRPr/>
+          </a:p>
+        </p:txBody>
+      </p:sp>
+      <p:sp>
+        <p:nvSpPr>
+          <p:cNvPr id="471" name="TextShape 3"/>
+          <p:cNvSpPr txBox="1"/>
+          <p:nvPr/>
+        </p:nvSpPr>
+        <p:spPr>
+          <a:xfrm>
+            <a:off x="2194560" y="17674920"/>
+            <a:ext cx="39501720" cy="9106920"/>
+          </a:xfrm>
+          <a:prstGeom prst="rect">
+            <a:avLst/>
+          </a:prstGeom>
+        </p:spPr>
+        <p:txBody>
+          <a:bodyPr lIns="0" rIns="0" tIns="0" bIns="0"/>
+          <a:p>
+            <a:endParaRPr/>
+          </a:p>
+        </p:txBody>
+      </p:sp>
     </p:spTree>
   </p:cSld>
 </p:sld>
@@ -17194,7 +17904,7 @@
         <p:spPr>
           <a:xfrm>
             <a:off x="2194560" y="1313280"/>
-            <a:ext cx="39499560" cy="25479720"/>
+            <a:ext cx="39499200" cy="25479360"/>
           </a:xfrm>
           <a:prstGeom prst="rect">
             <a:avLst/>
@@ -17236,7 +17946,7 @@
         <p:spPr>
           <a:xfrm>
             <a:off x="2194560" y="1313280"/>
-            <a:ext cx="39499560" cy="5495040"/>
+            <a:ext cx="39499200" cy="5494680"/>
           </a:xfrm>
           <a:prstGeom prst="rect">
             <a:avLst/>
@@ -17256,7 +17966,7 @@
         <p:spPr>
           <a:xfrm>
             <a:off x="2194560" y="7702560"/>
-            <a:ext cx="19274400" cy="9104760"/>
+            <a:ext cx="19274040" cy="9104400"/>
           </a:xfrm>
           <a:prstGeom prst="rect">
             <a:avLst/>
@@ -17276,7 +17986,7 @@
         <p:spPr>
           <a:xfrm>
             <a:off x="2194560" y="17674920"/>
-            <a:ext cx="19274400" cy="9104760"/>
+            <a:ext cx="19274040" cy="9104400"/>
           </a:xfrm>
           <a:prstGeom prst="rect">
             <a:avLst/>
@@ -17296,7 +18006,7 @@
         <p:spPr>
           <a:xfrm>
             <a:off x="22435200" y="7702560"/>
-            <a:ext cx="19274400" cy="19090080"/>
+            <a:ext cx="19274040" cy="19089720"/>
           </a:xfrm>
           <a:prstGeom prst="rect">
             <a:avLst/>
@@ -17338,7 +18048,7 @@
         <p:spPr>
           <a:xfrm>
             <a:off x="2194560" y="1313280"/>
-            <a:ext cx="39499560" cy="5495040"/>
+            <a:ext cx="39499200" cy="5494680"/>
           </a:xfrm>
           <a:prstGeom prst="rect">
             <a:avLst/>
@@ -17358,7 +18068,7 @@
         <p:spPr>
           <a:xfrm>
             <a:off x="2194560" y="7702560"/>
-            <a:ext cx="19274400" cy="19090080"/>
+            <a:ext cx="19274040" cy="19089720"/>
           </a:xfrm>
           <a:prstGeom prst="rect">
             <a:avLst/>
@@ -17378,7 +18088,7 @@
         <p:spPr>
           <a:xfrm>
             <a:off x="22435200" y="7702560"/>
-            <a:ext cx="19274400" cy="9104760"/>
+            <a:ext cx="19274040" cy="9104400"/>
           </a:xfrm>
           <a:prstGeom prst="rect">
             <a:avLst/>
@@ -17398,7 +18108,7 @@
         <p:spPr>
           <a:xfrm>
             <a:off x="22435200" y="17674920"/>
-            <a:ext cx="19274400" cy="9104760"/>
+            <a:ext cx="19274040" cy="9104400"/>
           </a:xfrm>
           <a:prstGeom prst="rect">
             <a:avLst/>
@@ -17440,7 +18150,7 @@
         <p:spPr>
           <a:xfrm>
             <a:off x="2194560" y="1313280"/>
-            <a:ext cx="39499560" cy="5495040"/>
+            <a:ext cx="39499200" cy="5494680"/>
           </a:xfrm>
           <a:prstGeom prst="rect">
             <a:avLst/>
@@ -17460,7 +18170,7 @@
         <p:spPr>
           <a:xfrm>
             <a:off x="2194560" y="7702560"/>
-            <a:ext cx="19274400" cy="9104760"/>
+            <a:ext cx="19274040" cy="9104400"/>
           </a:xfrm>
           <a:prstGeom prst="rect">
             <a:avLst/>
@@ -17480,7 +18190,7 @@
         <p:spPr>
           <a:xfrm>
             <a:off x="22435200" y="7702560"/>
-            <a:ext cx="19274400" cy="9104760"/>
+            <a:ext cx="19274040" cy="9104400"/>
           </a:xfrm>
           <a:prstGeom prst="rect">
             <a:avLst/>
@@ -17500,7 +18210,7 @@
         <p:spPr>
           <a:xfrm>
             <a:off x="2194560" y="17674920"/>
-            <a:ext cx="39499560" cy="9104760"/>
+            <a:ext cx="39499200" cy="9104400"/>
           </a:xfrm>
           <a:prstGeom prst="rect">
             <a:avLst/>
@@ -17542,7 +18252,7 @@
         <p:spPr>
           <a:xfrm>
             <a:off x="2194560" y="1313280"/>
-            <a:ext cx="39499560" cy="5495040"/>
+            <a:ext cx="39499200" cy="5494680"/>
           </a:xfrm>
           <a:prstGeom prst="rect">
             <a:avLst/>
@@ -17562,7 +18272,7 @@
         <p:spPr>
           <a:xfrm>
             <a:off x="2194560" y="7702560"/>
-            <a:ext cx="39499560" cy="9104760"/>
+            <a:ext cx="39499200" cy="9104400"/>
           </a:xfrm>
           <a:prstGeom prst="rect">
             <a:avLst/>
@@ -17582,7 +18292,7 @@
         <p:spPr>
           <a:xfrm>
             <a:off x="2194560" y="17674920"/>
-            <a:ext cx="39499560" cy="9104760"/>
+            <a:ext cx="39499200" cy="9104400"/>
           </a:xfrm>
           <a:prstGeom prst="rect">
             <a:avLst/>
@@ -17624,7 +18334,7 @@
         <p:spPr>
           <a:xfrm>
             <a:off x="2194560" y="1313280"/>
-            <a:ext cx="39499560" cy="5495040"/>
+            <a:ext cx="39499200" cy="5494680"/>
           </a:xfrm>
           <a:prstGeom prst="rect">
             <a:avLst/>
@@ -17644,7 +18354,7 @@
         <p:spPr>
           <a:xfrm>
             <a:off x="2194560" y="7702560"/>
-            <a:ext cx="19274400" cy="9104760"/>
+            <a:ext cx="19274040" cy="9104400"/>
           </a:xfrm>
           <a:prstGeom prst="rect">
             <a:avLst/>
@@ -17664,7 +18374,7 @@
         <p:spPr>
           <a:xfrm>
             <a:off x="22435200" y="7702560"/>
-            <a:ext cx="19274400" cy="9104760"/>
+            <a:ext cx="19274040" cy="9104400"/>
           </a:xfrm>
           <a:prstGeom prst="rect">
             <a:avLst/>
@@ -17684,7 +18394,7 @@
         <p:spPr>
           <a:xfrm>
             <a:off x="22435200" y="17674920"/>
-            <a:ext cx="19274400" cy="9104760"/>
+            <a:ext cx="19274040" cy="9104400"/>
           </a:xfrm>
           <a:prstGeom prst="rect">
             <a:avLst/>
@@ -17704,7 +18414,7 @@
         <p:spPr>
           <a:xfrm>
             <a:off x="2194560" y="17674920"/>
-            <a:ext cx="19274400" cy="9104760"/>
+            <a:ext cx="19274040" cy="9104400"/>
           </a:xfrm>
           <a:prstGeom prst="rect">
             <a:avLst/>
@@ -17746,7 +18456,7 @@
         <p:spPr>
           <a:xfrm>
             <a:off x="2194560" y="1313280"/>
-            <a:ext cx="39499560" cy="5495040"/>
+            <a:ext cx="39499200" cy="5494680"/>
           </a:xfrm>
           <a:prstGeom prst="rect">
             <a:avLst/>
@@ -17766,7 +18476,7 @@
         <p:spPr>
           <a:xfrm>
             <a:off x="2194560" y="7702560"/>
-            <a:ext cx="39499560" cy="19090080"/>
+            <a:ext cx="39499200" cy="19089720"/>
           </a:xfrm>
           <a:prstGeom prst="rect">
             <a:avLst/>
@@ -17786,7 +18496,7 @@
         <p:spPr>
           <a:xfrm>
             <a:off x="2194560" y="7702560"/>
-            <a:ext cx="39499560" cy="19090080"/>
+            <a:ext cx="39499200" cy="19089720"/>
           </a:xfrm>
           <a:prstGeom prst="rect">
             <a:avLst/>
@@ -17812,7 +18522,7 @@
         <p:spPr>
           <a:xfrm>
             <a:off x="9980640" y="7702560"/>
-            <a:ext cx="23926680" cy="19090080"/>
+            <a:ext cx="23926320" cy="19089720"/>
           </a:xfrm>
           <a:prstGeom prst="rect">
             <a:avLst/>
@@ -17837,7 +18547,7 @@
         <p:spPr>
           <a:xfrm>
             <a:off x="9980640" y="7702560"/>
-            <a:ext cx="23926680" cy="19090080"/>
+            <a:ext cx="23926320" cy="19089720"/>
           </a:xfrm>
           <a:prstGeom prst="rect">
             <a:avLst/>
@@ -17878,7 +18588,7 @@
         <p:spPr>
           <a:xfrm>
             <a:off x="2194560" y="1313280"/>
-            <a:ext cx="39500280" cy="5495760"/>
+            <a:ext cx="39499920" cy="5495400"/>
           </a:xfrm>
           <a:prstGeom prst="rect">
             <a:avLst/>
@@ -17898,7 +18608,7 @@
         <p:spPr>
           <a:xfrm>
             <a:off x="2194560" y="7702560"/>
-            <a:ext cx="19275120" cy="9105480"/>
+            <a:ext cx="19274760" cy="9105120"/>
           </a:xfrm>
           <a:prstGeom prst="rect">
             <a:avLst/>
@@ -17918,7 +18628,7 @@
         <p:spPr>
           <a:xfrm>
             <a:off x="22435200" y="7702560"/>
-            <a:ext cx="19275120" cy="9105480"/>
+            <a:ext cx="19274760" cy="9105120"/>
           </a:xfrm>
           <a:prstGeom prst="rect">
             <a:avLst/>
@@ -17938,7 +18648,7 @@
         <p:spPr>
           <a:xfrm>
             <a:off x="22435200" y="17674920"/>
-            <a:ext cx="19275120" cy="9105480"/>
+            <a:ext cx="19274760" cy="9105120"/>
           </a:xfrm>
           <a:prstGeom prst="rect">
             <a:avLst/>
@@ -17958,7 +18668,7 @@
         <p:spPr>
           <a:xfrm>
             <a:off x="2194560" y="17674920"/>
-            <a:ext cx="19275120" cy="9105480"/>
+            <a:ext cx="19274760" cy="9105120"/>
           </a:xfrm>
           <a:prstGeom prst="rect">
             <a:avLst/>

</xml_diff>